<commit_message>
Add qed, ed, ex, vi history
</commit_message>
<xml_diff>
--- a/presentation/vim/vim-in-dotnet.pptx
+++ b/presentation/vim/vim-in-dotnet.pptx
@@ -2,10 +2,11 @@
 <file path=ppt/presentation.xml><?xml version="1.0" encoding="utf-8"?>
 <p:presentation xmlns:a="http://schemas.openxmlformats.org/drawingml/2006/main" xmlns:r="http://schemas.openxmlformats.org/officeDocument/2006/relationships" xmlns:p="http://schemas.openxmlformats.org/presentationml/2006/main" saveSubsetFonts="1">
   <p:sldMasterIdLst>
-    <p:sldMasterId id="2147483660" r:id="rId1"/>
+    <p:sldMasterId id="2147483672" r:id="rId1"/>
   </p:sldMasterIdLst>
   <p:sldIdLst>
     <p:sldId id="256" r:id="rId2"/>
+    <p:sldId id="257" r:id="rId3"/>
   </p:sldIdLst>
   <p:sldSz cx="12192000" cy="6858000"/>
   <p:notesSz cx="6858000" cy="9144000"/>
@@ -660,7 +661,7 @@
     </p:spTree>
     <p:extLst>
       <p:ext uri="{BB962C8B-B14F-4D97-AF65-F5344CB8AC3E}">
-        <p14:creationId xmlns:p14="http://schemas.microsoft.com/office/powerpoint/2010/main" val="3262601562"/>
+        <p14:creationId xmlns:p14="http://schemas.microsoft.com/office/powerpoint/2010/main" val="31081691"/>
       </p:ext>
     </p:extLst>
   </p:cSld>
@@ -1159,7 +1160,7 @@
     </p:spTree>
     <p:extLst>
       <p:ext uri="{BB962C8B-B14F-4D97-AF65-F5344CB8AC3E}">
-        <p14:creationId xmlns:p14="http://schemas.microsoft.com/office/powerpoint/2010/main" val="1461927670"/>
+        <p14:creationId xmlns:p14="http://schemas.microsoft.com/office/powerpoint/2010/main" val="2284462951"/>
       </p:ext>
     </p:extLst>
   </p:cSld>
@@ -1392,7 +1393,7 @@
     </p:spTree>
     <p:extLst>
       <p:ext uri="{BB962C8B-B14F-4D97-AF65-F5344CB8AC3E}">
-        <p14:creationId xmlns:p14="http://schemas.microsoft.com/office/powerpoint/2010/main" val="1363460408"/>
+        <p14:creationId xmlns:p14="http://schemas.microsoft.com/office/powerpoint/2010/main" val="2967093123"/>
       </p:ext>
     </p:extLst>
   </p:cSld>
@@ -1537,7 +1538,7 @@
     </p:spTree>
     <p:extLst>
       <p:ext uri="{BB962C8B-B14F-4D97-AF65-F5344CB8AC3E}">
-        <p14:creationId xmlns:p14="http://schemas.microsoft.com/office/powerpoint/2010/main" val="287873608"/>
+        <p14:creationId xmlns:p14="http://schemas.microsoft.com/office/powerpoint/2010/main" val="4048938383"/>
       </p:ext>
     </p:extLst>
   </p:cSld>
@@ -1637,7 +1638,7 @@
     </p:spTree>
     <p:extLst>
       <p:ext uri="{BB962C8B-B14F-4D97-AF65-F5344CB8AC3E}">
-        <p14:creationId xmlns:p14="http://schemas.microsoft.com/office/powerpoint/2010/main" val="2175084146"/>
+        <p14:creationId xmlns:p14="http://schemas.microsoft.com/office/powerpoint/2010/main" val="3160428975"/>
       </p:ext>
     </p:extLst>
   </p:cSld>
@@ -2207,17 +2208,17 @@
     </p:spTree>
     <p:extLst>
       <p:ext uri="{BB962C8B-B14F-4D97-AF65-F5344CB8AC3E}">
-        <p14:creationId xmlns:p14="http://schemas.microsoft.com/office/powerpoint/2010/main" val="1197834852"/>
+        <p14:creationId xmlns:p14="http://schemas.microsoft.com/office/powerpoint/2010/main" val="752816032"/>
       </p:ext>
     </p:extLst>
   </p:cSld>
   <p:clrMap bg1="lt1" tx1="dk1" bg2="dk2" tx2="lt2" accent1="accent1" accent2="accent2" accent3="accent3" accent4="accent4" accent5="accent5" accent6="accent6" hlink="hlink" folHlink="folHlink"/>
   <p:sldLayoutIdLst>
-    <p:sldLayoutId id="2147483661" r:id="rId1"/>
-    <p:sldLayoutId id="2147483662" r:id="rId2"/>
-    <p:sldLayoutId id="2147483663" r:id="rId3"/>
-    <p:sldLayoutId id="2147483664" r:id="rId4"/>
-    <p:sldLayoutId id="2147483665" r:id="rId5"/>
+    <p:sldLayoutId id="2147483673" r:id="rId1"/>
+    <p:sldLayoutId id="2147483674" r:id="rId2"/>
+    <p:sldLayoutId id="2147483675" r:id="rId3"/>
+    <p:sldLayoutId id="2147483676" r:id="rId4"/>
+    <p:sldLayoutId id="2147483677" r:id="rId5"/>
   </p:sldLayoutIdLst>
   <p:txStyles>
     <p:titleStyle>
@@ -2978,6 +2979,83 @@
           </a:p>
         </p:txBody>
       </p:sp>
+      <p:pic>
+        <p:nvPicPr>
+          <p:cNvPr id="1026" name="Picture 2">
+            <a:extLst>
+              <a:ext uri="{FF2B5EF4-FFF2-40B4-BE49-F238E27FC236}">
+                <a16:creationId xmlns:a16="http://schemas.microsoft.com/office/drawing/2014/main" id="{CE4C5CDD-430E-4D45-9E5D-D4B42FFE274C}"/>
+              </a:ext>
+            </a:extLst>
+          </p:cNvPr>
+          <p:cNvPicPr>
+            <a:picLocks noChangeAspect="1" noChangeArrowheads="1"/>
+          </p:cNvPicPr>
+          <p:nvPr/>
+        </p:nvPicPr>
+        <p:blipFill>
+          <a:blip r:embed="rId2">
+            <a:extLst>
+              <a:ext uri="{28A0092B-C50C-407E-A947-70E740481C1C}">
+                <a14:useLocalDpi xmlns:a14="http://schemas.microsoft.com/office/drawing/2010/main" val="0"/>
+              </a:ext>
+            </a:extLst>
+          </a:blip>
+          <a:srcRect/>
+          <a:stretch>
+            <a:fillRect/>
+          </a:stretch>
+        </p:blipFill>
+        <p:spPr bwMode="auto">
+          <a:xfrm>
+            <a:off x="0" y="1397000"/>
+            <a:ext cx="12192000" cy="4064000"/>
+          </a:xfrm>
+          <a:prstGeom prst="rect">
+            <a:avLst/>
+          </a:prstGeom>
+          <a:noFill/>
+          <a:extLst>
+            <a:ext uri="{909E8E84-426E-40DD-AFC4-6F175D3DCCD1}">
+              <a14:hiddenFill xmlns:a14="http://schemas.microsoft.com/office/drawing/2010/main">
+                <a:solidFill>
+                  <a:srgbClr val="FFFFFF"/>
+                </a:solidFill>
+              </a14:hiddenFill>
+            </a:ext>
+          </a:extLst>
+        </p:spPr>
+      </p:pic>
+      <p:pic>
+        <p:nvPicPr>
+          <p:cNvPr id="4" name="Picture 3">
+            <a:extLst>
+              <a:ext uri="{FF2B5EF4-FFF2-40B4-BE49-F238E27FC236}">
+                <a16:creationId xmlns:a16="http://schemas.microsoft.com/office/drawing/2014/main" id="{07EF2895-E681-4983-93AE-EABE4120B09D}"/>
+              </a:ext>
+            </a:extLst>
+          </p:cNvPr>
+          <p:cNvPicPr>
+            <a:picLocks noChangeAspect="1"/>
+          </p:cNvPicPr>
+          <p:nvPr/>
+        </p:nvPicPr>
+        <p:blipFill>
+          <a:blip r:embed="rId3"/>
+          <a:stretch>
+            <a:fillRect/>
+          </a:stretch>
+        </p:blipFill>
+        <p:spPr>
+          <a:xfrm>
+            <a:off x="0" y="6270273"/>
+            <a:ext cx="1129537" cy="587727"/>
+          </a:xfrm>
+          <a:prstGeom prst="rect">
+            <a:avLst/>
+          </a:prstGeom>
+        </p:spPr>
+      </p:pic>
     </p:spTree>
     <p:extLst>
       <p:ext uri="{BB962C8B-B14F-4D97-AF65-F5344CB8AC3E}">
@@ -2991,39 +3069,2825 @@
 </p:sld>
 </file>
 
+<file path=ppt/slides/slide2.xml><?xml version="1.0" encoding="utf-8"?>
+<p:sld xmlns:a="http://schemas.openxmlformats.org/drawingml/2006/main" xmlns:r="http://schemas.openxmlformats.org/officeDocument/2006/relationships" xmlns:p="http://schemas.openxmlformats.org/presentationml/2006/main">
+  <p:cSld>
+    <p:spTree>
+      <p:nvGrpSpPr>
+        <p:cNvPr id="1" name=""/>
+        <p:cNvGrpSpPr/>
+        <p:nvPr/>
+      </p:nvGrpSpPr>
+      <p:grpSpPr>
+        <a:xfrm>
+          <a:off x="0" y="0"/>
+          <a:ext cx="0" cy="0"/>
+          <a:chOff x="0" y="0"/>
+          <a:chExt cx="0" cy="0"/>
+        </a:xfrm>
+      </p:grpSpPr>
+      <p:cxnSp>
+        <p:nvCxnSpPr>
+          <p:cNvPr id="65" name="Straight Connector 64">
+            <a:extLst>
+              <a:ext uri="{FF2B5EF4-FFF2-40B4-BE49-F238E27FC236}">
+                <a16:creationId xmlns:a16="http://schemas.microsoft.com/office/drawing/2014/main" id="{5A85F181-90B6-45F2-AE51-CA1B74488CE5}"/>
+              </a:ext>
+            </a:extLst>
+          </p:cNvPr>
+          <p:cNvCxnSpPr>
+            <a:cxnSpLocks/>
+            <a:stCxn id="64" idx="0"/>
+          </p:cNvCxnSpPr>
+          <p:nvPr/>
+        </p:nvCxnSpPr>
+        <p:spPr>
+          <a:xfrm>
+            <a:off x="9914960" y="3428195"/>
+            <a:ext cx="2277040" cy="0"/>
+          </a:xfrm>
+          <a:prstGeom prst="line">
+            <a:avLst/>
+          </a:prstGeom>
+          <a:ln w="19050">
+            <a:solidFill>
+              <a:schemeClr val="bg2"/>
+            </a:solidFill>
+          </a:ln>
+        </p:spPr>
+        <p:style>
+          <a:lnRef idx="1">
+            <a:schemeClr val="accent1"/>
+          </a:lnRef>
+          <a:fillRef idx="0">
+            <a:schemeClr val="accent1"/>
+          </a:fillRef>
+          <a:effectRef idx="0">
+            <a:schemeClr val="accent1"/>
+          </a:effectRef>
+          <a:fontRef idx="minor">
+            <a:schemeClr val="tx1"/>
+          </a:fontRef>
+        </p:style>
+      </p:cxnSp>
+      <p:cxnSp>
+        <p:nvCxnSpPr>
+          <p:cNvPr id="59" name="Straight Connector 58">
+            <a:extLst>
+              <a:ext uri="{FF2B5EF4-FFF2-40B4-BE49-F238E27FC236}">
+                <a16:creationId xmlns:a16="http://schemas.microsoft.com/office/drawing/2014/main" id="{8D3E2A26-0C00-4734-B223-209D405332EE}"/>
+              </a:ext>
+            </a:extLst>
+          </p:cNvPr>
+          <p:cNvCxnSpPr>
+            <a:cxnSpLocks/>
+            <a:stCxn id="63" idx="4"/>
+            <a:endCxn id="64" idx="4"/>
+          </p:cNvCxnSpPr>
+          <p:nvPr/>
+        </p:nvCxnSpPr>
+        <p:spPr>
+          <a:xfrm flipV="1">
+            <a:off x="7155309" y="3428106"/>
+            <a:ext cx="2369921" cy="90"/>
+          </a:xfrm>
+          <a:prstGeom prst="line">
+            <a:avLst/>
+          </a:prstGeom>
+          <a:ln w="19050">
+            <a:solidFill>
+              <a:schemeClr val="bg2"/>
+            </a:solidFill>
+          </a:ln>
+        </p:spPr>
+        <p:style>
+          <a:lnRef idx="1">
+            <a:schemeClr val="accent1"/>
+          </a:lnRef>
+          <a:fillRef idx="0">
+            <a:schemeClr val="accent1"/>
+          </a:fillRef>
+          <a:effectRef idx="0">
+            <a:schemeClr val="accent1"/>
+          </a:effectRef>
+          <a:fontRef idx="minor">
+            <a:schemeClr val="tx1"/>
+          </a:fontRef>
+        </p:style>
+      </p:cxnSp>
+      <p:cxnSp>
+        <p:nvCxnSpPr>
+          <p:cNvPr id="54" name="Straight Connector 53">
+            <a:extLst>
+              <a:ext uri="{FF2B5EF4-FFF2-40B4-BE49-F238E27FC236}">
+                <a16:creationId xmlns:a16="http://schemas.microsoft.com/office/drawing/2014/main" id="{9DC1E390-7DDF-42D3-A237-6661F71494E3}"/>
+              </a:ext>
+            </a:extLst>
+          </p:cNvPr>
+          <p:cNvCxnSpPr>
+            <a:cxnSpLocks/>
+            <a:endCxn id="63" idx="0"/>
+          </p:cNvCxnSpPr>
+          <p:nvPr/>
+        </p:nvCxnSpPr>
+        <p:spPr>
+          <a:xfrm flipV="1">
+            <a:off x="4958553" y="3428107"/>
+            <a:ext cx="1807026" cy="896"/>
+          </a:xfrm>
+          <a:prstGeom prst="line">
+            <a:avLst/>
+          </a:prstGeom>
+          <a:ln w="19050">
+            <a:solidFill>
+              <a:schemeClr val="bg2"/>
+            </a:solidFill>
+          </a:ln>
+        </p:spPr>
+        <p:style>
+          <a:lnRef idx="1">
+            <a:schemeClr val="accent1"/>
+          </a:lnRef>
+          <a:fillRef idx="0">
+            <a:schemeClr val="accent1"/>
+          </a:fillRef>
+          <a:effectRef idx="0">
+            <a:schemeClr val="accent1"/>
+          </a:effectRef>
+          <a:fontRef idx="minor">
+            <a:schemeClr val="tx1"/>
+          </a:fontRef>
+        </p:style>
+      </p:cxnSp>
+      <p:cxnSp>
+        <p:nvCxnSpPr>
+          <p:cNvPr id="19" name="Straight Connector 18">
+            <a:extLst>
+              <a:ext uri="{FF2B5EF4-FFF2-40B4-BE49-F238E27FC236}">
+                <a16:creationId xmlns:a16="http://schemas.microsoft.com/office/drawing/2014/main" id="{E102E2E1-36E5-4EB1-BA3F-7AB554ED1689}"/>
+              </a:ext>
+            </a:extLst>
+          </p:cNvPr>
+          <p:cNvCxnSpPr>
+            <a:cxnSpLocks/>
+            <a:stCxn id="44" idx="4"/>
+            <a:endCxn id="48" idx="4"/>
+          </p:cNvCxnSpPr>
+          <p:nvPr/>
+        </p:nvCxnSpPr>
+        <p:spPr>
+          <a:xfrm flipV="1">
+            <a:off x="2196756" y="3428106"/>
+            <a:ext cx="2369921" cy="90"/>
+          </a:xfrm>
+          <a:prstGeom prst="line">
+            <a:avLst/>
+          </a:prstGeom>
+          <a:ln w="19050">
+            <a:solidFill>
+              <a:schemeClr val="bg2"/>
+            </a:solidFill>
+          </a:ln>
+        </p:spPr>
+        <p:style>
+          <a:lnRef idx="1">
+            <a:schemeClr val="accent1"/>
+          </a:lnRef>
+          <a:fillRef idx="0">
+            <a:schemeClr val="accent1"/>
+          </a:fillRef>
+          <a:effectRef idx="0">
+            <a:schemeClr val="accent1"/>
+          </a:effectRef>
+          <a:fontRef idx="minor">
+            <a:schemeClr val="tx1"/>
+          </a:fontRef>
+        </p:style>
+      </p:cxnSp>
+      <p:pic>
+        <p:nvPicPr>
+          <p:cNvPr id="9" name="Picture 8">
+            <a:extLst>
+              <a:ext uri="{FF2B5EF4-FFF2-40B4-BE49-F238E27FC236}">
+                <a16:creationId xmlns:a16="http://schemas.microsoft.com/office/drawing/2014/main" id="{6456FD12-F4BC-4310-AE63-9AA197B003D0}"/>
+              </a:ext>
+            </a:extLst>
+          </p:cNvPr>
+          <p:cNvPicPr>
+            <a:picLocks noChangeAspect="1"/>
+          </p:cNvPicPr>
+          <p:nvPr/>
+        </p:nvPicPr>
+        <p:blipFill>
+          <a:blip r:embed="rId2"/>
+          <a:stretch>
+            <a:fillRect/>
+          </a:stretch>
+        </p:blipFill>
+        <p:spPr>
+          <a:xfrm>
+            <a:off x="0" y="6270273"/>
+            <a:ext cx="1129537" cy="587727"/>
+          </a:xfrm>
+          <a:prstGeom prst="rect">
+            <a:avLst/>
+          </a:prstGeom>
+        </p:spPr>
+      </p:pic>
+      <p:cxnSp>
+        <p:nvCxnSpPr>
+          <p:cNvPr id="11" name="Straight Connector 10">
+            <a:extLst>
+              <a:ext uri="{FF2B5EF4-FFF2-40B4-BE49-F238E27FC236}">
+                <a16:creationId xmlns:a16="http://schemas.microsoft.com/office/drawing/2014/main" id="{0ADCB6F3-3E94-4F06-B089-732D1AEFAE08}"/>
+              </a:ext>
+            </a:extLst>
+          </p:cNvPr>
+          <p:cNvCxnSpPr>
+            <a:cxnSpLocks/>
+            <a:endCxn id="44" idx="0"/>
+          </p:cNvCxnSpPr>
+          <p:nvPr/>
+        </p:nvCxnSpPr>
+        <p:spPr>
+          <a:xfrm flipV="1">
+            <a:off x="0" y="3428107"/>
+            <a:ext cx="1807026" cy="896"/>
+          </a:xfrm>
+          <a:prstGeom prst="line">
+            <a:avLst/>
+          </a:prstGeom>
+          <a:ln w="19050">
+            <a:solidFill>
+              <a:schemeClr val="bg2"/>
+            </a:solidFill>
+          </a:ln>
+        </p:spPr>
+        <p:style>
+          <a:lnRef idx="1">
+            <a:schemeClr val="accent1"/>
+          </a:lnRef>
+          <a:fillRef idx="0">
+            <a:schemeClr val="accent1"/>
+          </a:fillRef>
+          <a:effectRef idx="0">
+            <a:schemeClr val="accent1"/>
+          </a:effectRef>
+          <a:fontRef idx="minor">
+            <a:schemeClr val="tx1"/>
+          </a:fontRef>
+        </p:style>
+      </p:cxnSp>
+      <p:cxnSp>
+        <p:nvCxnSpPr>
+          <p:cNvPr id="14" name="Straight Connector 13">
+            <a:extLst>
+              <a:ext uri="{FF2B5EF4-FFF2-40B4-BE49-F238E27FC236}">
+                <a16:creationId xmlns:a16="http://schemas.microsoft.com/office/drawing/2014/main" id="{3416519E-911F-4A22-B6AF-236636B11C12}"/>
+              </a:ext>
+            </a:extLst>
+          </p:cNvPr>
+          <p:cNvCxnSpPr>
+            <a:cxnSpLocks/>
+            <a:stCxn id="44" idx="2"/>
+            <a:endCxn id="17" idx="0"/>
+          </p:cNvCxnSpPr>
+          <p:nvPr/>
+        </p:nvCxnSpPr>
+        <p:spPr>
+          <a:xfrm>
+            <a:off x="2003627" y="3623009"/>
+            <a:ext cx="775" cy="1097615"/>
+          </a:xfrm>
+          <a:prstGeom prst="line">
+            <a:avLst/>
+          </a:prstGeom>
+          <a:ln w="19050">
+            <a:solidFill>
+              <a:schemeClr val="bg2"/>
+            </a:solidFill>
+          </a:ln>
+        </p:spPr>
+        <p:style>
+          <a:lnRef idx="1">
+            <a:schemeClr val="accent1"/>
+          </a:lnRef>
+          <a:fillRef idx="0">
+            <a:schemeClr val="accent1"/>
+          </a:fillRef>
+          <a:effectRef idx="0">
+            <a:schemeClr val="accent1"/>
+          </a:effectRef>
+          <a:fontRef idx="minor">
+            <a:schemeClr val="tx1"/>
+          </a:fontRef>
+        </p:style>
+      </p:cxnSp>
+      <p:sp>
+        <p:nvSpPr>
+          <p:cNvPr id="16" name="TextBox 15">
+            <a:extLst>
+              <a:ext uri="{FF2B5EF4-FFF2-40B4-BE49-F238E27FC236}">
+                <a16:creationId xmlns:a16="http://schemas.microsoft.com/office/drawing/2014/main" id="{1B23594A-89BD-4DCC-9D31-3EA61E7E291D}"/>
+              </a:ext>
+            </a:extLst>
+          </p:cNvPr>
+          <p:cNvSpPr txBox="1"/>
+          <p:nvPr/>
+        </p:nvSpPr>
+        <p:spPr>
+          <a:xfrm>
+            <a:off x="1456745" y="2794204"/>
+            <a:ext cx="1249960" cy="523220"/>
+          </a:xfrm>
+          <a:prstGeom prst="rect">
+            <a:avLst/>
+          </a:prstGeom>
+          <a:noFill/>
+        </p:spPr>
+        <p:txBody>
+          <a:bodyPr wrap="square" rtlCol="0">
+            <a:spAutoFit/>
+          </a:bodyPr>
+          <a:lstStyle/>
+          <a:p>
+            <a:r>
+              <a:rPr lang="en-US" sz="2800" dirty="0">
+                <a:solidFill>
+                  <a:schemeClr val="tx2"/>
+                </a:solidFill>
+                <a:latin typeface="+mj-lt"/>
+              </a:rPr>
+              <a:t>1966</a:t>
+            </a:r>
+          </a:p>
+        </p:txBody>
+      </p:sp>
+      <p:sp>
+        <p:nvSpPr>
+          <p:cNvPr id="17" name="Diamond 16">
+            <a:extLst>
+              <a:ext uri="{FF2B5EF4-FFF2-40B4-BE49-F238E27FC236}">
+                <a16:creationId xmlns:a16="http://schemas.microsoft.com/office/drawing/2014/main" id="{F263611B-5402-4C1C-9AAC-D7EAE6AF0435}"/>
+              </a:ext>
+            </a:extLst>
+          </p:cNvPr>
+          <p:cNvSpPr/>
+          <p:nvPr/>
+        </p:nvSpPr>
+        <p:spPr>
+          <a:xfrm>
+            <a:off x="1899851" y="4720624"/>
+            <a:ext cx="209101" cy="221456"/>
+          </a:xfrm>
+          <a:prstGeom prst="diamond">
+            <a:avLst/>
+          </a:prstGeom>
+          <a:solidFill>
+            <a:schemeClr val="accent1"/>
+          </a:solidFill>
+          <a:ln>
+            <a:solidFill>
+              <a:schemeClr val="bg2"/>
+            </a:solidFill>
+          </a:ln>
+        </p:spPr>
+        <p:style>
+          <a:lnRef idx="2">
+            <a:schemeClr val="accent1">
+              <a:shade val="50000"/>
+            </a:schemeClr>
+          </a:lnRef>
+          <a:fillRef idx="1">
+            <a:schemeClr val="accent1"/>
+          </a:fillRef>
+          <a:effectRef idx="0">
+            <a:schemeClr val="accent1"/>
+          </a:effectRef>
+          <a:fontRef idx="minor">
+            <a:schemeClr val="lt1"/>
+          </a:fontRef>
+        </p:style>
+        <p:txBody>
+          <a:bodyPr rtlCol="0" anchor="ctr"/>
+          <a:lstStyle/>
+          <a:p>
+            <a:pPr algn="ctr"/>
+            <a:endParaRPr lang="en-US"/>
+          </a:p>
+        </p:txBody>
+      </p:sp>
+      <p:sp>
+        <p:nvSpPr>
+          <p:cNvPr id="18" name="TextBox 17">
+            <a:extLst>
+              <a:ext uri="{FF2B5EF4-FFF2-40B4-BE49-F238E27FC236}">
+                <a16:creationId xmlns:a16="http://schemas.microsoft.com/office/drawing/2014/main" id="{8CA93ECE-5690-4C38-82AA-45969B779F42}"/>
+              </a:ext>
+            </a:extLst>
+          </p:cNvPr>
+          <p:cNvSpPr txBox="1"/>
+          <p:nvPr/>
+        </p:nvSpPr>
+        <p:spPr>
+          <a:xfrm>
+            <a:off x="994095" y="5129558"/>
+            <a:ext cx="3182367" cy="707886"/>
+          </a:xfrm>
+          <a:prstGeom prst="rect">
+            <a:avLst/>
+          </a:prstGeom>
+          <a:noFill/>
+        </p:spPr>
+        <p:txBody>
+          <a:bodyPr wrap="square" rtlCol="0">
+            <a:spAutoFit/>
+          </a:bodyPr>
+          <a:lstStyle/>
+          <a:p>
+            <a:r>
+              <a:rPr lang="en-US" sz="2000" dirty="0">
+                <a:solidFill>
+                  <a:schemeClr val="tx2"/>
+                </a:solidFill>
+                <a:latin typeface="+mj-lt"/>
+              </a:rPr>
+              <a:t>Ken Thompson</a:t>
+            </a:r>
+          </a:p>
+          <a:p>
+            <a:r>
+              <a:rPr lang="en-US" sz="2000" dirty="0">
+                <a:solidFill>
+                  <a:schemeClr val="tx2"/>
+                </a:solidFill>
+                <a:latin typeface="+mj-lt"/>
+              </a:rPr>
+              <a:t>QED</a:t>
+            </a:r>
+          </a:p>
+        </p:txBody>
+      </p:sp>
+      <p:cxnSp>
+        <p:nvCxnSpPr>
+          <p:cNvPr id="21" name="Straight Connector 20">
+            <a:extLst>
+              <a:ext uri="{FF2B5EF4-FFF2-40B4-BE49-F238E27FC236}">
+                <a16:creationId xmlns:a16="http://schemas.microsoft.com/office/drawing/2014/main" id="{8AB21D8B-9B1E-4600-B5CA-1421241F109E}"/>
+              </a:ext>
+            </a:extLst>
+          </p:cNvPr>
+          <p:cNvCxnSpPr>
+            <a:cxnSpLocks/>
+          </p:cNvCxnSpPr>
+          <p:nvPr/>
+        </p:nvCxnSpPr>
+        <p:spPr>
+          <a:xfrm>
+            <a:off x="4757294" y="1745757"/>
+            <a:ext cx="1737" cy="1487331"/>
+          </a:xfrm>
+          <a:prstGeom prst="line">
+            <a:avLst/>
+          </a:prstGeom>
+          <a:ln w="19050">
+            <a:solidFill>
+              <a:schemeClr val="bg2"/>
+            </a:solidFill>
+          </a:ln>
+        </p:spPr>
+        <p:style>
+          <a:lnRef idx="1">
+            <a:schemeClr val="accent1"/>
+          </a:lnRef>
+          <a:fillRef idx="0">
+            <a:schemeClr val="accent1"/>
+          </a:fillRef>
+          <a:effectRef idx="0">
+            <a:schemeClr val="accent1"/>
+          </a:effectRef>
+          <a:fontRef idx="minor">
+            <a:schemeClr val="tx1"/>
+          </a:fontRef>
+        </p:style>
+      </p:cxnSp>
+      <p:sp>
+        <p:nvSpPr>
+          <p:cNvPr id="22" name="TextBox 21">
+            <a:extLst>
+              <a:ext uri="{FF2B5EF4-FFF2-40B4-BE49-F238E27FC236}">
+                <a16:creationId xmlns:a16="http://schemas.microsoft.com/office/drawing/2014/main" id="{7B4E7A58-7D43-4F48-97CC-4BAB0A37F73A}"/>
+              </a:ext>
+            </a:extLst>
+          </p:cNvPr>
+          <p:cNvSpPr txBox="1"/>
+          <p:nvPr/>
+        </p:nvSpPr>
+        <p:spPr>
+          <a:xfrm>
+            <a:off x="4176462" y="3623213"/>
+            <a:ext cx="1249960" cy="523220"/>
+          </a:xfrm>
+          <a:prstGeom prst="rect">
+            <a:avLst/>
+          </a:prstGeom>
+          <a:noFill/>
+        </p:spPr>
+        <p:txBody>
+          <a:bodyPr wrap="square" rtlCol="0">
+            <a:spAutoFit/>
+          </a:bodyPr>
+          <a:lstStyle/>
+          <a:p>
+            <a:r>
+              <a:rPr lang="en-US" sz="2800" dirty="0">
+                <a:solidFill>
+                  <a:schemeClr val="tx2"/>
+                </a:solidFill>
+                <a:latin typeface="+mj-lt"/>
+              </a:rPr>
+              <a:t>1969</a:t>
+            </a:r>
+          </a:p>
+        </p:txBody>
+      </p:sp>
+      <p:sp>
+        <p:nvSpPr>
+          <p:cNvPr id="23" name="Diamond 22">
+            <a:extLst>
+              <a:ext uri="{FF2B5EF4-FFF2-40B4-BE49-F238E27FC236}">
+                <a16:creationId xmlns:a16="http://schemas.microsoft.com/office/drawing/2014/main" id="{69F434F1-F38F-4A99-9AC9-245DB9A7FDD2}"/>
+              </a:ext>
+            </a:extLst>
+          </p:cNvPr>
+          <p:cNvSpPr/>
+          <p:nvPr/>
+        </p:nvSpPr>
+        <p:spPr>
+          <a:xfrm>
+            <a:off x="4650361" y="1530148"/>
+            <a:ext cx="209101" cy="221456"/>
+          </a:xfrm>
+          <a:prstGeom prst="diamond">
+            <a:avLst/>
+          </a:prstGeom>
+          <a:solidFill>
+            <a:schemeClr val="accent2"/>
+          </a:solidFill>
+          <a:ln>
+            <a:solidFill>
+              <a:schemeClr val="bg2"/>
+            </a:solidFill>
+          </a:ln>
+        </p:spPr>
+        <p:style>
+          <a:lnRef idx="2">
+            <a:schemeClr val="accent1">
+              <a:shade val="50000"/>
+            </a:schemeClr>
+          </a:lnRef>
+          <a:fillRef idx="1">
+            <a:schemeClr val="accent1"/>
+          </a:fillRef>
+          <a:effectRef idx="0">
+            <a:schemeClr val="accent1"/>
+          </a:effectRef>
+          <a:fontRef idx="minor">
+            <a:schemeClr val="lt1"/>
+          </a:fontRef>
+        </p:style>
+        <p:txBody>
+          <a:bodyPr rtlCol="0" anchor="ctr"/>
+          <a:lstStyle/>
+          <a:p>
+            <a:pPr algn="ctr"/>
+            <a:endParaRPr lang="en-US"/>
+          </a:p>
+        </p:txBody>
+      </p:sp>
+      <p:sp>
+        <p:nvSpPr>
+          <p:cNvPr id="24" name="TextBox 23">
+            <a:extLst>
+              <a:ext uri="{FF2B5EF4-FFF2-40B4-BE49-F238E27FC236}">
+                <a16:creationId xmlns:a16="http://schemas.microsoft.com/office/drawing/2014/main" id="{011EDAF3-4F0D-4C17-A6D9-E507785807F7}"/>
+              </a:ext>
+            </a:extLst>
+          </p:cNvPr>
+          <p:cNvSpPr txBox="1"/>
+          <p:nvPr/>
+        </p:nvSpPr>
+        <p:spPr>
+          <a:xfrm>
+            <a:off x="3835238" y="627199"/>
+            <a:ext cx="3182367" cy="707886"/>
+          </a:xfrm>
+          <a:prstGeom prst="rect">
+            <a:avLst/>
+          </a:prstGeom>
+          <a:noFill/>
+        </p:spPr>
+        <p:txBody>
+          <a:bodyPr wrap="square" rtlCol="0">
+            <a:spAutoFit/>
+          </a:bodyPr>
+          <a:lstStyle/>
+          <a:p>
+            <a:r>
+              <a:rPr lang="en-US" sz="2000" dirty="0">
+                <a:solidFill>
+                  <a:schemeClr val="tx2"/>
+                </a:solidFill>
+                <a:latin typeface="+mj-lt"/>
+              </a:rPr>
+              <a:t>Ken Thompson</a:t>
+            </a:r>
+          </a:p>
+          <a:p>
+            <a:r>
+              <a:rPr lang="en-US" sz="2000" dirty="0">
+                <a:solidFill>
+                  <a:schemeClr val="tx2"/>
+                </a:solidFill>
+                <a:latin typeface="+mj-lt"/>
+              </a:rPr>
+              <a:t>ed</a:t>
+            </a:r>
+          </a:p>
+        </p:txBody>
+      </p:sp>
+      <p:sp>
+        <p:nvSpPr>
+          <p:cNvPr id="44" name="Right Triangle 43">
+            <a:extLst>
+              <a:ext uri="{FF2B5EF4-FFF2-40B4-BE49-F238E27FC236}">
+                <a16:creationId xmlns:a16="http://schemas.microsoft.com/office/drawing/2014/main" id="{D8E49B9C-55BA-44E6-A7ED-DD3D4511945F}"/>
+              </a:ext>
+            </a:extLst>
+          </p:cNvPr>
+          <p:cNvSpPr/>
+          <p:nvPr/>
+        </p:nvSpPr>
+        <p:spPr>
+          <a:xfrm rot="18885080">
+            <a:off x="1864731" y="3289733"/>
+            <a:ext cx="274320" cy="276837"/>
+          </a:xfrm>
+          <a:prstGeom prst="rtTriangle">
+            <a:avLst/>
+          </a:prstGeom>
+          <a:solidFill>
+            <a:schemeClr val="accent1"/>
+          </a:solidFill>
+          <a:ln w="19050">
+            <a:solidFill>
+              <a:schemeClr val="bg2"/>
+            </a:solidFill>
+          </a:ln>
+        </p:spPr>
+        <p:style>
+          <a:lnRef idx="2">
+            <a:schemeClr val="accent1">
+              <a:shade val="50000"/>
+            </a:schemeClr>
+          </a:lnRef>
+          <a:fillRef idx="1">
+            <a:schemeClr val="accent1"/>
+          </a:fillRef>
+          <a:effectRef idx="0">
+            <a:schemeClr val="accent1"/>
+          </a:effectRef>
+          <a:fontRef idx="minor">
+            <a:schemeClr val="lt1"/>
+          </a:fontRef>
+        </p:style>
+        <p:txBody>
+          <a:bodyPr rtlCol="0" anchor="ctr"/>
+          <a:lstStyle/>
+          <a:p>
+            <a:pPr algn="ctr"/>
+            <a:endParaRPr lang="en-US"/>
+          </a:p>
+        </p:txBody>
+      </p:sp>
+      <p:sp>
+        <p:nvSpPr>
+          <p:cNvPr id="48" name="Right Triangle 47">
+            <a:extLst>
+              <a:ext uri="{FF2B5EF4-FFF2-40B4-BE49-F238E27FC236}">
+                <a16:creationId xmlns:a16="http://schemas.microsoft.com/office/drawing/2014/main" id="{9E9E5461-3ACF-413B-BA17-26CE3B1FAA22}"/>
+              </a:ext>
+            </a:extLst>
+          </p:cNvPr>
+          <p:cNvSpPr/>
+          <p:nvPr/>
+        </p:nvSpPr>
+        <p:spPr>
+          <a:xfrm rot="8085080">
+            <a:off x="4624382" y="3289732"/>
+            <a:ext cx="274320" cy="276837"/>
+          </a:xfrm>
+          <a:prstGeom prst="rtTriangle">
+            <a:avLst/>
+          </a:prstGeom>
+          <a:solidFill>
+            <a:schemeClr val="accent2"/>
+          </a:solidFill>
+          <a:ln w="19050">
+            <a:solidFill>
+              <a:schemeClr val="bg2"/>
+            </a:solidFill>
+          </a:ln>
+        </p:spPr>
+        <p:style>
+          <a:lnRef idx="2">
+            <a:schemeClr val="accent1">
+              <a:shade val="50000"/>
+            </a:schemeClr>
+          </a:lnRef>
+          <a:fillRef idx="1">
+            <a:schemeClr val="accent1"/>
+          </a:fillRef>
+          <a:effectRef idx="0">
+            <a:schemeClr val="accent1"/>
+          </a:effectRef>
+          <a:fontRef idx="minor">
+            <a:schemeClr val="lt1"/>
+          </a:fontRef>
+        </p:style>
+        <p:txBody>
+          <a:bodyPr rtlCol="0" anchor="ctr"/>
+          <a:lstStyle/>
+          <a:p>
+            <a:pPr algn="ctr"/>
+            <a:endParaRPr lang="en-US"/>
+          </a:p>
+        </p:txBody>
+      </p:sp>
+      <p:cxnSp>
+        <p:nvCxnSpPr>
+          <p:cNvPr id="55" name="Straight Connector 54">
+            <a:extLst>
+              <a:ext uri="{FF2B5EF4-FFF2-40B4-BE49-F238E27FC236}">
+                <a16:creationId xmlns:a16="http://schemas.microsoft.com/office/drawing/2014/main" id="{6C7D55D9-F1FB-43CB-B407-D96648CE5D99}"/>
+              </a:ext>
+            </a:extLst>
+          </p:cNvPr>
+          <p:cNvCxnSpPr>
+            <a:cxnSpLocks/>
+            <a:stCxn id="63" idx="2"/>
+            <a:endCxn id="57" idx="0"/>
+          </p:cNvCxnSpPr>
+          <p:nvPr/>
+        </p:nvCxnSpPr>
+        <p:spPr>
+          <a:xfrm>
+            <a:off x="6962180" y="3623009"/>
+            <a:ext cx="775" cy="1097615"/>
+          </a:xfrm>
+          <a:prstGeom prst="line">
+            <a:avLst/>
+          </a:prstGeom>
+          <a:ln w="19050">
+            <a:solidFill>
+              <a:schemeClr val="bg2"/>
+            </a:solidFill>
+          </a:ln>
+        </p:spPr>
+        <p:style>
+          <a:lnRef idx="1">
+            <a:schemeClr val="accent1"/>
+          </a:lnRef>
+          <a:fillRef idx="0">
+            <a:schemeClr val="accent1"/>
+          </a:fillRef>
+          <a:effectRef idx="0">
+            <a:schemeClr val="accent1"/>
+          </a:effectRef>
+          <a:fontRef idx="minor">
+            <a:schemeClr val="tx1"/>
+          </a:fontRef>
+        </p:style>
+      </p:cxnSp>
+      <p:sp>
+        <p:nvSpPr>
+          <p:cNvPr id="56" name="TextBox 55">
+            <a:extLst>
+              <a:ext uri="{FF2B5EF4-FFF2-40B4-BE49-F238E27FC236}">
+                <a16:creationId xmlns:a16="http://schemas.microsoft.com/office/drawing/2014/main" id="{B70A6D55-E37F-4B6C-89B8-AB5CB71198B4}"/>
+              </a:ext>
+            </a:extLst>
+          </p:cNvPr>
+          <p:cNvSpPr txBox="1"/>
+          <p:nvPr/>
+        </p:nvSpPr>
+        <p:spPr>
+          <a:xfrm>
+            <a:off x="6415298" y="2794204"/>
+            <a:ext cx="1249960" cy="523220"/>
+          </a:xfrm>
+          <a:prstGeom prst="rect">
+            <a:avLst/>
+          </a:prstGeom>
+          <a:noFill/>
+        </p:spPr>
+        <p:txBody>
+          <a:bodyPr wrap="square" rtlCol="0">
+            <a:spAutoFit/>
+          </a:bodyPr>
+          <a:lstStyle/>
+          <a:p>
+            <a:r>
+              <a:rPr lang="en-US" sz="2800" dirty="0">
+                <a:solidFill>
+                  <a:schemeClr val="tx2"/>
+                </a:solidFill>
+                <a:latin typeface="+mj-lt"/>
+              </a:rPr>
+              <a:t>1975</a:t>
+            </a:r>
+          </a:p>
+        </p:txBody>
+      </p:sp>
+      <p:sp>
+        <p:nvSpPr>
+          <p:cNvPr id="57" name="Diamond 56">
+            <a:extLst>
+              <a:ext uri="{FF2B5EF4-FFF2-40B4-BE49-F238E27FC236}">
+                <a16:creationId xmlns:a16="http://schemas.microsoft.com/office/drawing/2014/main" id="{56880C42-9FB7-48DD-B7B5-827F1A55CA4B}"/>
+              </a:ext>
+            </a:extLst>
+          </p:cNvPr>
+          <p:cNvSpPr/>
+          <p:nvPr/>
+        </p:nvSpPr>
+        <p:spPr>
+          <a:xfrm>
+            <a:off x="6858404" y="4720624"/>
+            <a:ext cx="209101" cy="221456"/>
+          </a:xfrm>
+          <a:prstGeom prst="diamond">
+            <a:avLst/>
+          </a:prstGeom>
+          <a:solidFill>
+            <a:schemeClr val="accent3"/>
+          </a:solidFill>
+          <a:ln>
+            <a:solidFill>
+              <a:schemeClr val="bg2"/>
+            </a:solidFill>
+          </a:ln>
+        </p:spPr>
+        <p:style>
+          <a:lnRef idx="2">
+            <a:schemeClr val="accent1">
+              <a:shade val="50000"/>
+            </a:schemeClr>
+          </a:lnRef>
+          <a:fillRef idx="1">
+            <a:schemeClr val="accent1"/>
+          </a:fillRef>
+          <a:effectRef idx="0">
+            <a:schemeClr val="accent1"/>
+          </a:effectRef>
+          <a:fontRef idx="minor">
+            <a:schemeClr val="lt1"/>
+          </a:fontRef>
+        </p:style>
+        <p:txBody>
+          <a:bodyPr rtlCol="0" anchor="ctr"/>
+          <a:lstStyle/>
+          <a:p>
+            <a:pPr algn="ctr"/>
+            <a:endParaRPr lang="en-US"/>
+          </a:p>
+        </p:txBody>
+      </p:sp>
+      <p:sp>
+        <p:nvSpPr>
+          <p:cNvPr id="58" name="TextBox 57">
+            <a:extLst>
+              <a:ext uri="{FF2B5EF4-FFF2-40B4-BE49-F238E27FC236}">
+                <a16:creationId xmlns:a16="http://schemas.microsoft.com/office/drawing/2014/main" id="{EC035D2C-8BB7-43C2-A47C-1258D975CCE9}"/>
+              </a:ext>
+            </a:extLst>
+          </p:cNvPr>
+          <p:cNvSpPr txBox="1"/>
+          <p:nvPr/>
+        </p:nvSpPr>
+        <p:spPr>
+          <a:xfrm>
+            <a:off x="5952648" y="5129558"/>
+            <a:ext cx="3182367" cy="584775"/>
+          </a:xfrm>
+          <a:prstGeom prst="rect">
+            <a:avLst/>
+          </a:prstGeom>
+          <a:noFill/>
+        </p:spPr>
+        <p:txBody>
+          <a:bodyPr wrap="square" rtlCol="0">
+            <a:spAutoFit/>
+          </a:bodyPr>
+          <a:lstStyle/>
+          <a:p>
+            <a:r>
+              <a:rPr lang="en-US" sz="1600" dirty="0">
+                <a:solidFill>
+                  <a:schemeClr val="tx2"/>
+                </a:solidFill>
+                <a:latin typeface="+mj-lt"/>
+              </a:rPr>
+              <a:t>George </a:t>
+            </a:r>
+            <a:r>
+              <a:rPr lang="en-US" sz="1600" dirty="0" err="1">
+                <a:solidFill>
+                  <a:schemeClr val="tx2"/>
+                </a:solidFill>
+                <a:latin typeface="+mj-lt"/>
+              </a:rPr>
+              <a:t>Coulouris</a:t>
+            </a:r>
+            <a:endParaRPr lang="en-US" sz="1600" dirty="0">
+              <a:solidFill>
+                <a:schemeClr val="tx2"/>
+              </a:solidFill>
+              <a:latin typeface="+mj-lt"/>
+            </a:endParaRPr>
+          </a:p>
+          <a:p>
+            <a:r>
+              <a:rPr lang="en-US" sz="1600" dirty="0" err="1">
+                <a:solidFill>
+                  <a:schemeClr val="tx2"/>
+                </a:solidFill>
+                <a:latin typeface="+mj-lt"/>
+              </a:rPr>
+              <a:t>em</a:t>
+            </a:r>
+            <a:r>
+              <a:rPr lang="en-US" sz="1600" dirty="0">
+                <a:solidFill>
+                  <a:schemeClr val="tx2"/>
+                </a:solidFill>
+                <a:latin typeface="+mj-lt"/>
+              </a:rPr>
+              <a:t>, “editor for mortals”</a:t>
+            </a:r>
+          </a:p>
+        </p:txBody>
+      </p:sp>
+      <p:cxnSp>
+        <p:nvCxnSpPr>
+          <p:cNvPr id="60" name="Straight Connector 59">
+            <a:extLst>
+              <a:ext uri="{FF2B5EF4-FFF2-40B4-BE49-F238E27FC236}">
+                <a16:creationId xmlns:a16="http://schemas.microsoft.com/office/drawing/2014/main" id="{46579633-6E91-469A-BEA4-240885032149}"/>
+              </a:ext>
+            </a:extLst>
+          </p:cNvPr>
+          <p:cNvCxnSpPr>
+            <a:cxnSpLocks/>
+          </p:cNvCxnSpPr>
+          <p:nvPr/>
+        </p:nvCxnSpPr>
+        <p:spPr>
+          <a:xfrm>
+            <a:off x="9715847" y="1745757"/>
+            <a:ext cx="1737" cy="1487331"/>
+          </a:xfrm>
+          <a:prstGeom prst="line">
+            <a:avLst/>
+          </a:prstGeom>
+          <a:ln w="19050">
+            <a:solidFill>
+              <a:schemeClr val="bg2"/>
+            </a:solidFill>
+          </a:ln>
+        </p:spPr>
+        <p:style>
+          <a:lnRef idx="1">
+            <a:schemeClr val="accent1"/>
+          </a:lnRef>
+          <a:fillRef idx="0">
+            <a:schemeClr val="accent1"/>
+          </a:fillRef>
+          <a:effectRef idx="0">
+            <a:schemeClr val="accent1"/>
+          </a:effectRef>
+          <a:fontRef idx="minor">
+            <a:schemeClr val="tx1"/>
+          </a:fontRef>
+        </p:style>
+      </p:cxnSp>
+      <p:sp>
+        <p:nvSpPr>
+          <p:cNvPr id="61" name="TextBox 60">
+            <a:extLst>
+              <a:ext uri="{FF2B5EF4-FFF2-40B4-BE49-F238E27FC236}">
+                <a16:creationId xmlns:a16="http://schemas.microsoft.com/office/drawing/2014/main" id="{386AA534-1FC2-44B2-AC5A-BEA3A2B8CCB9}"/>
+              </a:ext>
+            </a:extLst>
+          </p:cNvPr>
+          <p:cNvSpPr txBox="1"/>
+          <p:nvPr/>
+        </p:nvSpPr>
+        <p:spPr>
+          <a:xfrm>
+            <a:off x="9135015" y="3623213"/>
+            <a:ext cx="1249960" cy="523220"/>
+          </a:xfrm>
+          <a:prstGeom prst="rect">
+            <a:avLst/>
+          </a:prstGeom>
+          <a:noFill/>
+        </p:spPr>
+        <p:txBody>
+          <a:bodyPr wrap="square" rtlCol="0">
+            <a:spAutoFit/>
+          </a:bodyPr>
+          <a:lstStyle/>
+          <a:p>
+            <a:r>
+              <a:rPr lang="en-US" sz="2800" dirty="0">
+                <a:solidFill>
+                  <a:schemeClr val="tx2"/>
+                </a:solidFill>
+                <a:latin typeface="+mj-lt"/>
+              </a:rPr>
+              <a:t>1976</a:t>
+            </a:r>
+          </a:p>
+        </p:txBody>
+      </p:sp>
+      <p:sp>
+        <p:nvSpPr>
+          <p:cNvPr id="62" name="Diamond 61">
+            <a:extLst>
+              <a:ext uri="{FF2B5EF4-FFF2-40B4-BE49-F238E27FC236}">
+                <a16:creationId xmlns:a16="http://schemas.microsoft.com/office/drawing/2014/main" id="{FEC08B7F-EB2C-4E84-BF70-2BBE66DF7B61}"/>
+              </a:ext>
+            </a:extLst>
+          </p:cNvPr>
+          <p:cNvSpPr/>
+          <p:nvPr/>
+        </p:nvSpPr>
+        <p:spPr>
+          <a:xfrm>
+            <a:off x="9608914" y="1530148"/>
+            <a:ext cx="209101" cy="221456"/>
+          </a:xfrm>
+          <a:prstGeom prst="diamond">
+            <a:avLst/>
+          </a:prstGeom>
+          <a:solidFill>
+            <a:schemeClr val="accent4"/>
+          </a:solidFill>
+          <a:ln>
+            <a:solidFill>
+              <a:schemeClr val="bg2"/>
+            </a:solidFill>
+          </a:ln>
+        </p:spPr>
+        <p:style>
+          <a:lnRef idx="2">
+            <a:schemeClr val="accent1">
+              <a:shade val="50000"/>
+            </a:schemeClr>
+          </a:lnRef>
+          <a:fillRef idx="1">
+            <a:schemeClr val="accent1"/>
+          </a:fillRef>
+          <a:effectRef idx="0">
+            <a:schemeClr val="accent1"/>
+          </a:effectRef>
+          <a:fontRef idx="minor">
+            <a:schemeClr val="lt1"/>
+          </a:fontRef>
+        </p:style>
+        <p:txBody>
+          <a:bodyPr rtlCol="0" anchor="ctr"/>
+          <a:lstStyle/>
+          <a:p>
+            <a:pPr algn="ctr"/>
+            <a:endParaRPr lang="en-US"/>
+          </a:p>
+        </p:txBody>
+      </p:sp>
+      <p:sp>
+        <p:nvSpPr>
+          <p:cNvPr id="63" name="Right Triangle 62">
+            <a:extLst>
+              <a:ext uri="{FF2B5EF4-FFF2-40B4-BE49-F238E27FC236}">
+                <a16:creationId xmlns:a16="http://schemas.microsoft.com/office/drawing/2014/main" id="{34268D9A-D4D6-4E92-A336-6D6F018DB950}"/>
+              </a:ext>
+            </a:extLst>
+          </p:cNvPr>
+          <p:cNvSpPr/>
+          <p:nvPr/>
+        </p:nvSpPr>
+        <p:spPr>
+          <a:xfrm rot="18885080">
+            <a:off x="6823284" y="3289733"/>
+            <a:ext cx="274320" cy="276837"/>
+          </a:xfrm>
+          <a:prstGeom prst="rtTriangle">
+            <a:avLst/>
+          </a:prstGeom>
+          <a:solidFill>
+            <a:schemeClr val="accent3"/>
+          </a:solidFill>
+          <a:ln w="19050">
+            <a:solidFill>
+              <a:schemeClr val="bg2"/>
+            </a:solidFill>
+          </a:ln>
+        </p:spPr>
+        <p:style>
+          <a:lnRef idx="2">
+            <a:schemeClr val="accent1">
+              <a:shade val="50000"/>
+            </a:schemeClr>
+          </a:lnRef>
+          <a:fillRef idx="1">
+            <a:schemeClr val="accent1"/>
+          </a:fillRef>
+          <a:effectRef idx="0">
+            <a:schemeClr val="accent1"/>
+          </a:effectRef>
+          <a:fontRef idx="minor">
+            <a:schemeClr val="lt1"/>
+          </a:fontRef>
+        </p:style>
+        <p:txBody>
+          <a:bodyPr rtlCol="0" anchor="ctr"/>
+          <a:lstStyle/>
+          <a:p>
+            <a:pPr algn="ctr"/>
+            <a:endParaRPr lang="en-US"/>
+          </a:p>
+        </p:txBody>
+      </p:sp>
+      <p:sp>
+        <p:nvSpPr>
+          <p:cNvPr id="64" name="Right Triangle 63">
+            <a:extLst>
+              <a:ext uri="{FF2B5EF4-FFF2-40B4-BE49-F238E27FC236}">
+                <a16:creationId xmlns:a16="http://schemas.microsoft.com/office/drawing/2014/main" id="{608E77D6-A4F6-4A7A-98FD-21D638C9B525}"/>
+              </a:ext>
+            </a:extLst>
+          </p:cNvPr>
+          <p:cNvSpPr/>
+          <p:nvPr/>
+        </p:nvSpPr>
+        <p:spPr>
+          <a:xfrm rot="8085080">
+            <a:off x="9582935" y="3289732"/>
+            <a:ext cx="274320" cy="276837"/>
+          </a:xfrm>
+          <a:prstGeom prst="rtTriangle">
+            <a:avLst/>
+          </a:prstGeom>
+          <a:solidFill>
+            <a:schemeClr val="accent4"/>
+          </a:solidFill>
+          <a:ln w="19050">
+            <a:solidFill>
+              <a:schemeClr val="bg2"/>
+            </a:solidFill>
+          </a:ln>
+        </p:spPr>
+        <p:style>
+          <a:lnRef idx="2">
+            <a:schemeClr val="accent1">
+              <a:shade val="50000"/>
+            </a:schemeClr>
+          </a:lnRef>
+          <a:fillRef idx="1">
+            <a:schemeClr val="accent1"/>
+          </a:fillRef>
+          <a:effectRef idx="0">
+            <a:schemeClr val="accent1"/>
+          </a:effectRef>
+          <a:fontRef idx="minor">
+            <a:schemeClr val="lt1"/>
+          </a:fontRef>
+        </p:style>
+        <p:txBody>
+          <a:bodyPr rtlCol="0" anchor="ctr"/>
+          <a:lstStyle/>
+          <a:p>
+            <a:pPr algn="ctr"/>
+            <a:endParaRPr lang="en-US"/>
+          </a:p>
+        </p:txBody>
+      </p:sp>
+      <p:sp>
+        <p:nvSpPr>
+          <p:cNvPr id="68" name="TextBox 67">
+            <a:extLst>
+              <a:ext uri="{FF2B5EF4-FFF2-40B4-BE49-F238E27FC236}">
+                <a16:creationId xmlns:a16="http://schemas.microsoft.com/office/drawing/2014/main" id="{43431C51-26E1-4738-82AF-BF5BD554CE38}"/>
+              </a:ext>
+            </a:extLst>
+          </p:cNvPr>
+          <p:cNvSpPr txBox="1"/>
+          <p:nvPr/>
+        </p:nvSpPr>
+        <p:spPr>
+          <a:xfrm>
+            <a:off x="8535134" y="499160"/>
+            <a:ext cx="3182367" cy="830997"/>
+          </a:xfrm>
+          <a:prstGeom prst="rect">
+            <a:avLst/>
+          </a:prstGeom>
+          <a:noFill/>
+        </p:spPr>
+        <p:txBody>
+          <a:bodyPr wrap="square" rtlCol="0">
+            <a:spAutoFit/>
+          </a:bodyPr>
+          <a:lstStyle/>
+          <a:p>
+            <a:r>
+              <a:rPr lang="en-US" sz="1600" dirty="0">
+                <a:solidFill>
+                  <a:schemeClr val="tx2"/>
+                </a:solidFill>
+                <a:latin typeface="+mj-lt"/>
+              </a:rPr>
+              <a:t>Bill Joy</a:t>
+            </a:r>
+          </a:p>
+          <a:p>
+            <a:r>
+              <a:rPr lang="en-US" sz="1600" dirty="0">
+                <a:solidFill>
+                  <a:schemeClr val="tx2"/>
+                </a:solidFill>
+                <a:latin typeface="+mj-lt"/>
+              </a:rPr>
+              <a:t>ex, “extended ed”</a:t>
+            </a:r>
+          </a:p>
+          <a:p>
+            <a:r>
+              <a:rPr lang="en-US" sz="1600" dirty="0">
+                <a:solidFill>
+                  <a:schemeClr val="tx2"/>
+                </a:solidFill>
+                <a:latin typeface="+mj-lt"/>
+              </a:rPr>
+              <a:t>vi</a:t>
+            </a:r>
+          </a:p>
+        </p:txBody>
+      </p:sp>
+    </p:spTree>
+    <p:extLst>
+      <p:ext uri="{BB962C8B-B14F-4D97-AF65-F5344CB8AC3E}">
+        <p14:creationId xmlns:p14="http://schemas.microsoft.com/office/powerpoint/2010/main" val="1409725812"/>
+      </p:ext>
+    </p:extLst>
+  </p:cSld>
+  <p:clrMapOvr>
+    <a:masterClrMapping/>
+  </p:clrMapOvr>
+  <p:timing>
+    <p:tnLst>
+      <p:par>
+        <p:cTn id="1" dur="indefinite" restart="never" nodeType="tmRoot">
+          <p:childTnLst>
+            <p:seq concurrent="1" nextAc="seek">
+              <p:cTn id="2" dur="indefinite" nodeType="mainSeq">
+                <p:childTnLst>
+                  <p:par>
+                    <p:cTn id="3" fill="hold">
+                      <p:stCondLst>
+                        <p:cond delay="indefinite"/>
+                      </p:stCondLst>
+                      <p:childTnLst>
+                        <p:par>
+                          <p:cTn id="4" fill="hold">
+                            <p:stCondLst>
+                              <p:cond delay="0"/>
+                            </p:stCondLst>
+                            <p:childTnLst>
+                              <p:par>
+                                <p:cTn id="5" presetID="22" presetClass="entr" presetSubtype="8" fill="hold" nodeType="clickEffect">
+                                  <p:stCondLst>
+                                    <p:cond delay="0"/>
+                                  </p:stCondLst>
+                                  <p:childTnLst>
+                                    <p:set>
+                                      <p:cBhvr>
+                                        <p:cTn id="6" dur="1" fill="hold">
+                                          <p:stCondLst>
+                                            <p:cond delay="0"/>
+                                          </p:stCondLst>
+                                        </p:cTn>
+                                        <p:tgtEl>
+                                          <p:spTgt spid="11"/>
+                                        </p:tgtEl>
+                                        <p:attrNameLst>
+                                          <p:attrName>style.visibility</p:attrName>
+                                        </p:attrNameLst>
+                                      </p:cBhvr>
+                                      <p:to>
+                                        <p:strVal val="visible"/>
+                                      </p:to>
+                                    </p:set>
+                                    <p:animEffect transition="in" filter="wipe(left)">
+                                      <p:cBhvr>
+                                        <p:cTn id="7" dur="500"/>
+                                        <p:tgtEl>
+                                          <p:spTgt spid="11"/>
+                                        </p:tgtEl>
+                                      </p:cBhvr>
+                                    </p:animEffect>
+                                  </p:childTnLst>
+                                </p:cTn>
+                              </p:par>
+                            </p:childTnLst>
+                          </p:cTn>
+                        </p:par>
+                        <p:par>
+                          <p:cTn id="8" fill="hold">
+                            <p:stCondLst>
+                              <p:cond delay="500"/>
+                            </p:stCondLst>
+                            <p:childTnLst>
+                              <p:par>
+                                <p:cTn id="9" presetID="1" presetClass="entr" presetSubtype="0" fill="hold" grpId="0" nodeType="afterEffect">
+                                  <p:stCondLst>
+                                    <p:cond delay="0"/>
+                                  </p:stCondLst>
+                                  <p:childTnLst>
+                                    <p:set>
+                                      <p:cBhvr>
+                                        <p:cTn id="10" dur="1" fill="hold">
+                                          <p:stCondLst>
+                                            <p:cond delay="0"/>
+                                          </p:stCondLst>
+                                        </p:cTn>
+                                        <p:tgtEl>
+                                          <p:spTgt spid="16"/>
+                                        </p:tgtEl>
+                                        <p:attrNameLst>
+                                          <p:attrName>style.visibility</p:attrName>
+                                        </p:attrNameLst>
+                                      </p:cBhvr>
+                                      <p:to>
+                                        <p:strVal val="visible"/>
+                                      </p:to>
+                                    </p:set>
+                                  </p:childTnLst>
+                                </p:cTn>
+                              </p:par>
+                            </p:childTnLst>
+                          </p:cTn>
+                        </p:par>
+                        <p:par>
+                          <p:cTn id="11" fill="hold">
+                            <p:stCondLst>
+                              <p:cond delay="500"/>
+                            </p:stCondLst>
+                            <p:childTnLst>
+                              <p:par>
+                                <p:cTn id="12" presetID="53" presetClass="entr" presetSubtype="16" fill="hold" grpId="0" nodeType="afterEffect">
+                                  <p:stCondLst>
+                                    <p:cond delay="0"/>
+                                  </p:stCondLst>
+                                  <p:childTnLst>
+                                    <p:set>
+                                      <p:cBhvr>
+                                        <p:cTn id="13" dur="1" fill="hold">
+                                          <p:stCondLst>
+                                            <p:cond delay="0"/>
+                                          </p:stCondLst>
+                                        </p:cTn>
+                                        <p:tgtEl>
+                                          <p:spTgt spid="44"/>
+                                        </p:tgtEl>
+                                        <p:attrNameLst>
+                                          <p:attrName>style.visibility</p:attrName>
+                                        </p:attrNameLst>
+                                      </p:cBhvr>
+                                      <p:to>
+                                        <p:strVal val="visible"/>
+                                      </p:to>
+                                    </p:set>
+                                    <p:anim calcmode="lin" valueType="num">
+                                      <p:cBhvr>
+                                        <p:cTn id="14" dur="250" fill="hold"/>
+                                        <p:tgtEl>
+                                          <p:spTgt spid="44"/>
+                                        </p:tgtEl>
+                                        <p:attrNameLst>
+                                          <p:attrName>ppt_w</p:attrName>
+                                        </p:attrNameLst>
+                                      </p:cBhvr>
+                                      <p:tavLst>
+                                        <p:tav tm="0">
+                                          <p:val>
+                                            <p:fltVal val="0"/>
+                                          </p:val>
+                                        </p:tav>
+                                        <p:tav tm="100000">
+                                          <p:val>
+                                            <p:strVal val="#ppt_w"/>
+                                          </p:val>
+                                        </p:tav>
+                                      </p:tavLst>
+                                    </p:anim>
+                                    <p:anim calcmode="lin" valueType="num">
+                                      <p:cBhvr>
+                                        <p:cTn id="15" dur="250" fill="hold"/>
+                                        <p:tgtEl>
+                                          <p:spTgt spid="44"/>
+                                        </p:tgtEl>
+                                        <p:attrNameLst>
+                                          <p:attrName>ppt_h</p:attrName>
+                                        </p:attrNameLst>
+                                      </p:cBhvr>
+                                      <p:tavLst>
+                                        <p:tav tm="0">
+                                          <p:val>
+                                            <p:fltVal val="0"/>
+                                          </p:val>
+                                        </p:tav>
+                                        <p:tav tm="100000">
+                                          <p:val>
+                                            <p:strVal val="#ppt_h"/>
+                                          </p:val>
+                                        </p:tav>
+                                      </p:tavLst>
+                                    </p:anim>
+                                    <p:animEffect transition="in" filter="fade">
+                                      <p:cBhvr>
+                                        <p:cTn id="16" dur="250"/>
+                                        <p:tgtEl>
+                                          <p:spTgt spid="44"/>
+                                        </p:tgtEl>
+                                      </p:cBhvr>
+                                    </p:animEffect>
+                                  </p:childTnLst>
+                                </p:cTn>
+                              </p:par>
+                            </p:childTnLst>
+                          </p:cTn>
+                        </p:par>
+                        <p:par>
+                          <p:cTn id="17" fill="hold">
+                            <p:stCondLst>
+                              <p:cond delay="750"/>
+                            </p:stCondLst>
+                            <p:childTnLst>
+                              <p:par>
+                                <p:cTn id="18" presetID="22" presetClass="entr" presetSubtype="1" fill="hold" nodeType="afterEffect">
+                                  <p:stCondLst>
+                                    <p:cond delay="0"/>
+                                  </p:stCondLst>
+                                  <p:childTnLst>
+                                    <p:set>
+                                      <p:cBhvr>
+                                        <p:cTn id="19" dur="1" fill="hold">
+                                          <p:stCondLst>
+                                            <p:cond delay="0"/>
+                                          </p:stCondLst>
+                                        </p:cTn>
+                                        <p:tgtEl>
+                                          <p:spTgt spid="14"/>
+                                        </p:tgtEl>
+                                        <p:attrNameLst>
+                                          <p:attrName>style.visibility</p:attrName>
+                                        </p:attrNameLst>
+                                      </p:cBhvr>
+                                      <p:to>
+                                        <p:strVal val="visible"/>
+                                      </p:to>
+                                    </p:set>
+                                    <p:animEffect transition="in" filter="wipe(up)">
+                                      <p:cBhvr>
+                                        <p:cTn id="20" dur="500"/>
+                                        <p:tgtEl>
+                                          <p:spTgt spid="14"/>
+                                        </p:tgtEl>
+                                      </p:cBhvr>
+                                    </p:animEffect>
+                                  </p:childTnLst>
+                                </p:cTn>
+                              </p:par>
+                            </p:childTnLst>
+                          </p:cTn>
+                        </p:par>
+                        <p:par>
+                          <p:cTn id="21" fill="hold">
+                            <p:stCondLst>
+                              <p:cond delay="1250"/>
+                            </p:stCondLst>
+                            <p:childTnLst>
+                              <p:par>
+                                <p:cTn id="22" presetID="53" presetClass="entr" presetSubtype="16" fill="hold" grpId="0" nodeType="afterEffect">
+                                  <p:stCondLst>
+                                    <p:cond delay="0"/>
+                                  </p:stCondLst>
+                                  <p:childTnLst>
+                                    <p:set>
+                                      <p:cBhvr>
+                                        <p:cTn id="23" dur="1" fill="hold">
+                                          <p:stCondLst>
+                                            <p:cond delay="0"/>
+                                          </p:stCondLst>
+                                        </p:cTn>
+                                        <p:tgtEl>
+                                          <p:spTgt spid="17"/>
+                                        </p:tgtEl>
+                                        <p:attrNameLst>
+                                          <p:attrName>style.visibility</p:attrName>
+                                        </p:attrNameLst>
+                                      </p:cBhvr>
+                                      <p:to>
+                                        <p:strVal val="visible"/>
+                                      </p:to>
+                                    </p:set>
+                                    <p:anim calcmode="lin" valueType="num">
+                                      <p:cBhvr>
+                                        <p:cTn id="24" dur="250" fill="hold"/>
+                                        <p:tgtEl>
+                                          <p:spTgt spid="17"/>
+                                        </p:tgtEl>
+                                        <p:attrNameLst>
+                                          <p:attrName>ppt_w</p:attrName>
+                                        </p:attrNameLst>
+                                      </p:cBhvr>
+                                      <p:tavLst>
+                                        <p:tav tm="0">
+                                          <p:val>
+                                            <p:fltVal val="0"/>
+                                          </p:val>
+                                        </p:tav>
+                                        <p:tav tm="100000">
+                                          <p:val>
+                                            <p:strVal val="#ppt_w"/>
+                                          </p:val>
+                                        </p:tav>
+                                      </p:tavLst>
+                                    </p:anim>
+                                    <p:anim calcmode="lin" valueType="num">
+                                      <p:cBhvr>
+                                        <p:cTn id="25" dur="250" fill="hold"/>
+                                        <p:tgtEl>
+                                          <p:spTgt spid="17"/>
+                                        </p:tgtEl>
+                                        <p:attrNameLst>
+                                          <p:attrName>ppt_h</p:attrName>
+                                        </p:attrNameLst>
+                                      </p:cBhvr>
+                                      <p:tavLst>
+                                        <p:tav tm="0">
+                                          <p:val>
+                                            <p:fltVal val="0"/>
+                                          </p:val>
+                                        </p:tav>
+                                        <p:tav tm="100000">
+                                          <p:val>
+                                            <p:strVal val="#ppt_h"/>
+                                          </p:val>
+                                        </p:tav>
+                                      </p:tavLst>
+                                    </p:anim>
+                                    <p:animEffect transition="in" filter="fade">
+                                      <p:cBhvr>
+                                        <p:cTn id="26" dur="250"/>
+                                        <p:tgtEl>
+                                          <p:spTgt spid="17"/>
+                                        </p:tgtEl>
+                                      </p:cBhvr>
+                                    </p:animEffect>
+                                  </p:childTnLst>
+                                </p:cTn>
+                              </p:par>
+                            </p:childTnLst>
+                          </p:cTn>
+                        </p:par>
+                        <p:par>
+                          <p:cTn id="27" fill="hold">
+                            <p:stCondLst>
+                              <p:cond delay="1500"/>
+                            </p:stCondLst>
+                            <p:childTnLst>
+                              <p:par>
+                                <p:cTn id="28" presetID="1" presetClass="entr" presetSubtype="0" fill="hold" grpId="0" nodeType="afterEffect">
+                                  <p:stCondLst>
+                                    <p:cond delay="0"/>
+                                  </p:stCondLst>
+                                  <p:childTnLst>
+                                    <p:set>
+                                      <p:cBhvr>
+                                        <p:cTn id="29" dur="1" fill="hold">
+                                          <p:stCondLst>
+                                            <p:cond delay="0"/>
+                                          </p:stCondLst>
+                                        </p:cTn>
+                                        <p:tgtEl>
+                                          <p:spTgt spid="18"/>
+                                        </p:tgtEl>
+                                        <p:attrNameLst>
+                                          <p:attrName>style.visibility</p:attrName>
+                                        </p:attrNameLst>
+                                      </p:cBhvr>
+                                      <p:to>
+                                        <p:strVal val="visible"/>
+                                      </p:to>
+                                    </p:set>
+                                  </p:childTnLst>
+                                </p:cTn>
+                              </p:par>
+                            </p:childTnLst>
+                          </p:cTn>
+                        </p:par>
+                      </p:childTnLst>
+                    </p:cTn>
+                  </p:par>
+                  <p:par>
+                    <p:cTn id="30" fill="hold">
+                      <p:stCondLst>
+                        <p:cond delay="indefinite"/>
+                      </p:stCondLst>
+                      <p:childTnLst>
+                        <p:par>
+                          <p:cTn id="31" fill="hold">
+                            <p:stCondLst>
+                              <p:cond delay="0"/>
+                            </p:stCondLst>
+                            <p:childTnLst>
+                              <p:par>
+                                <p:cTn id="32" presetID="22" presetClass="entr" presetSubtype="8" fill="hold" nodeType="clickEffect">
+                                  <p:stCondLst>
+                                    <p:cond delay="0"/>
+                                  </p:stCondLst>
+                                  <p:childTnLst>
+                                    <p:set>
+                                      <p:cBhvr>
+                                        <p:cTn id="33" dur="1" fill="hold">
+                                          <p:stCondLst>
+                                            <p:cond delay="0"/>
+                                          </p:stCondLst>
+                                        </p:cTn>
+                                        <p:tgtEl>
+                                          <p:spTgt spid="19"/>
+                                        </p:tgtEl>
+                                        <p:attrNameLst>
+                                          <p:attrName>style.visibility</p:attrName>
+                                        </p:attrNameLst>
+                                      </p:cBhvr>
+                                      <p:to>
+                                        <p:strVal val="visible"/>
+                                      </p:to>
+                                    </p:set>
+                                    <p:animEffect transition="in" filter="wipe(left)">
+                                      <p:cBhvr>
+                                        <p:cTn id="34" dur="500"/>
+                                        <p:tgtEl>
+                                          <p:spTgt spid="19"/>
+                                        </p:tgtEl>
+                                      </p:cBhvr>
+                                    </p:animEffect>
+                                  </p:childTnLst>
+                                </p:cTn>
+                              </p:par>
+                            </p:childTnLst>
+                          </p:cTn>
+                        </p:par>
+                        <p:par>
+                          <p:cTn id="35" fill="hold">
+                            <p:stCondLst>
+                              <p:cond delay="500"/>
+                            </p:stCondLst>
+                            <p:childTnLst>
+                              <p:par>
+                                <p:cTn id="36" presetID="1" presetClass="entr" presetSubtype="0" fill="hold" grpId="0" nodeType="afterEffect">
+                                  <p:stCondLst>
+                                    <p:cond delay="0"/>
+                                  </p:stCondLst>
+                                  <p:childTnLst>
+                                    <p:set>
+                                      <p:cBhvr>
+                                        <p:cTn id="37" dur="1" fill="hold">
+                                          <p:stCondLst>
+                                            <p:cond delay="0"/>
+                                          </p:stCondLst>
+                                        </p:cTn>
+                                        <p:tgtEl>
+                                          <p:spTgt spid="22"/>
+                                        </p:tgtEl>
+                                        <p:attrNameLst>
+                                          <p:attrName>style.visibility</p:attrName>
+                                        </p:attrNameLst>
+                                      </p:cBhvr>
+                                      <p:to>
+                                        <p:strVal val="visible"/>
+                                      </p:to>
+                                    </p:set>
+                                  </p:childTnLst>
+                                </p:cTn>
+                              </p:par>
+                            </p:childTnLst>
+                          </p:cTn>
+                        </p:par>
+                        <p:par>
+                          <p:cTn id="38" fill="hold">
+                            <p:stCondLst>
+                              <p:cond delay="500"/>
+                            </p:stCondLst>
+                            <p:childTnLst>
+                              <p:par>
+                                <p:cTn id="39" presetID="53" presetClass="entr" presetSubtype="16" fill="hold" grpId="0" nodeType="afterEffect">
+                                  <p:stCondLst>
+                                    <p:cond delay="0"/>
+                                  </p:stCondLst>
+                                  <p:childTnLst>
+                                    <p:set>
+                                      <p:cBhvr>
+                                        <p:cTn id="40" dur="1" fill="hold">
+                                          <p:stCondLst>
+                                            <p:cond delay="0"/>
+                                          </p:stCondLst>
+                                        </p:cTn>
+                                        <p:tgtEl>
+                                          <p:spTgt spid="48"/>
+                                        </p:tgtEl>
+                                        <p:attrNameLst>
+                                          <p:attrName>style.visibility</p:attrName>
+                                        </p:attrNameLst>
+                                      </p:cBhvr>
+                                      <p:to>
+                                        <p:strVal val="visible"/>
+                                      </p:to>
+                                    </p:set>
+                                    <p:anim calcmode="lin" valueType="num">
+                                      <p:cBhvr>
+                                        <p:cTn id="41" dur="250" fill="hold"/>
+                                        <p:tgtEl>
+                                          <p:spTgt spid="48"/>
+                                        </p:tgtEl>
+                                        <p:attrNameLst>
+                                          <p:attrName>ppt_w</p:attrName>
+                                        </p:attrNameLst>
+                                      </p:cBhvr>
+                                      <p:tavLst>
+                                        <p:tav tm="0">
+                                          <p:val>
+                                            <p:fltVal val="0"/>
+                                          </p:val>
+                                        </p:tav>
+                                        <p:tav tm="100000">
+                                          <p:val>
+                                            <p:strVal val="#ppt_w"/>
+                                          </p:val>
+                                        </p:tav>
+                                      </p:tavLst>
+                                    </p:anim>
+                                    <p:anim calcmode="lin" valueType="num">
+                                      <p:cBhvr>
+                                        <p:cTn id="42" dur="250" fill="hold"/>
+                                        <p:tgtEl>
+                                          <p:spTgt spid="48"/>
+                                        </p:tgtEl>
+                                        <p:attrNameLst>
+                                          <p:attrName>ppt_h</p:attrName>
+                                        </p:attrNameLst>
+                                      </p:cBhvr>
+                                      <p:tavLst>
+                                        <p:tav tm="0">
+                                          <p:val>
+                                            <p:fltVal val="0"/>
+                                          </p:val>
+                                        </p:tav>
+                                        <p:tav tm="100000">
+                                          <p:val>
+                                            <p:strVal val="#ppt_h"/>
+                                          </p:val>
+                                        </p:tav>
+                                      </p:tavLst>
+                                    </p:anim>
+                                    <p:animEffect transition="in" filter="fade">
+                                      <p:cBhvr>
+                                        <p:cTn id="43" dur="250"/>
+                                        <p:tgtEl>
+                                          <p:spTgt spid="48"/>
+                                        </p:tgtEl>
+                                      </p:cBhvr>
+                                    </p:animEffect>
+                                  </p:childTnLst>
+                                </p:cTn>
+                              </p:par>
+                            </p:childTnLst>
+                          </p:cTn>
+                        </p:par>
+                        <p:par>
+                          <p:cTn id="44" fill="hold">
+                            <p:stCondLst>
+                              <p:cond delay="750"/>
+                            </p:stCondLst>
+                            <p:childTnLst>
+                              <p:par>
+                                <p:cTn id="45" presetID="22" presetClass="entr" presetSubtype="4" fill="hold" nodeType="afterEffect">
+                                  <p:stCondLst>
+                                    <p:cond delay="0"/>
+                                  </p:stCondLst>
+                                  <p:childTnLst>
+                                    <p:set>
+                                      <p:cBhvr>
+                                        <p:cTn id="46" dur="1" fill="hold">
+                                          <p:stCondLst>
+                                            <p:cond delay="0"/>
+                                          </p:stCondLst>
+                                        </p:cTn>
+                                        <p:tgtEl>
+                                          <p:spTgt spid="21"/>
+                                        </p:tgtEl>
+                                        <p:attrNameLst>
+                                          <p:attrName>style.visibility</p:attrName>
+                                        </p:attrNameLst>
+                                      </p:cBhvr>
+                                      <p:to>
+                                        <p:strVal val="visible"/>
+                                      </p:to>
+                                    </p:set>
+                                    <p:animEffect transition="in" filter="wipe(down)">
+                                      <p:cBhvr>
+                                        <p:cTn id="47" dur="500"/>
+                                        <p:tgtEl>
+                                          <p:spTgt spid="21"/>
+                                        </p:tgtEl>
+                                      </p:cBhvr>
+                                    </p:animEffect>
+                                  </p:childTnLst>
+                                </p:cTn>
+                              </p:par>
+                            </p:childTnLst>
+                          </p:cTn>
+                        </p:par>
+                        <p:par>
+                          <p:cTn id="48" fill="hold">
+                            <p:stCondLst>
+                              <p:cond delay="1250"/>
+                            </p:stCondLst>
+                            <p:childTnLst>
+                              <p:par>
+                                <p:cTn id="49" presetID="53" presetClass="entr" presetSubtype="16" fill="hold" grpId="0" nodeType="afterEffect">
+                                  <p:stCondLst>
+                                    <p:cond delay="0"/>
+                                  </p:stCondLst>
+                                  <p:childTnLst>
+                                    <p:set>
+                                      <p:cBhvr>
+                                        <p:cTn id="50" dur="1" fill="hold">
+                                          <p:stCondLst>
+                                            <p:cond delay="0"/>
+                                          </p:stCondLst>
+                                        </p:cTn>
+                                        <p:tgtEl>
+                                          <p:spTgt spid="23"/>
+                                        </p:tgtEl>
+                                        <p:attrNameLst>
+                                          <p:attrName>style.visibility</p:attrName>
+                                        </p:attrNameLst>
+                                      </p:cBhvr>
+                                      <p:to>
+                                        <p:strVal val="visible"/>
+                                      </p:to>
+                                    </p:set>
+                                    <p:anim calcmode="lin" valueType="num">
+                                      <p:cBhvr>
+                                        <p:cTn id="51" dur="250" fill="hold"/>
+                                        <p:tgtEl>
+                                          <p:spTgt spid="23"/>
+                                        </p:tgtEl>
+                                        <p:attrNameLst>
+                                          <p:attrName>ppt_w</p:attrName>
+                                        </p:attrNameLst>
+                                      </p:cBhvr>
+                                      <p:tavLst>
+                                        <p:tav tm="0">
+                                          <p:val>
+                                            <p:fltVal val="0"/>
+                                          </p:val>
+                                        </p:tav>
+                                        <p:tav tm="100000">
+                                          <p:val>
+                                            <p:strVal val="#ppt_w"/>
+                                          </p:val>
+                                        </p:tav>
+                                      </p:tavLst>
+                                    </p:anim>
+                                    <p:anim calcmode="lin" valueType="num">
+                                      <p:cBhvr>
+                                        <p:cTn id="52" dur="250" fill="hold"/>
+                                        <p:tgtEl>
+                                          <p:spTgt spid="23"/>
+                                        </p:tgtEl>
+                                        <p:attrNameLst>
+                                          <p:attrName>ppt_h</p:attrName>
+                                        </p:attrNameLst>
+                                      </p:cBhvr>
+                                      <p:tavLst>
+                                        <p:tav tm="0">
+                                          <p:val>
+                                            <p:fltVal val="0"/>
+                                          </p:val>
+                                        </p:tav>
+                                        <p:tav tm="100000">
+                                          <p:val>
+                                            <p:strVal val="#ppt_h"/>
+                                          </p:val>
+                                        </p:tav>
+                                      </p:tavLst>
+                                    </p:anim>
+                                    <p:animEffect transition="in" filter="fade">
+                                      <p:cBhvr>
+                                        <p:cTn id="53" dur="250"/>
+                                        <p:tgtEl>
+                                          <p:spTgt spid="23"/>
+                                        </p:tgtEl>
+                                      </p:cBhvr>
+                                    </p:animEffect>
+                                  </p:childTnLst>
+                                </p:cTn>
+                              </p:par>
+                            </p:childTnLst>
+                          </p:cTn>
+                        </p:par>
+                        <p:par>
+                          <p:cTn id="54" fill="hold">
+                            <p:stCondLst>
+                              <p:cond delay="1500"/>
+                            </p:stCondLst>
+                            <p:childTnLst>
+                              <p:par>
+                                <p:cTn id="55" presetID="1" presetClass="entr" presetSubtype="0" fill="hold" grpId="0" nodeType="afterEffect">
+                                  <p:stCondLst>
+                                    <p:cond delay="0"/>
+                                  </p:stCondLst>
+                                  <p:childTnLst>
+                                    <p:set>
+                                      <p:cBhvr>
+                                        <p:cTn id="56" dur="1" fill="hold">
+                                          <p:stCondLst>
+                                            <p:cond delay="0"/>
+                                          </p:stCondLst>
+                                        </p:cTn>
+                                        <p:tgtEl>
+                                          <p:spTgt spid="24"/>
+                                        </p:tgtEl>
+                                        <p:attrNameLst>
+                                          <p:attrName>style.visibility</p:attrName>
+                                        </p:attrNameLst>
+                                      </p:cBhvr>
+                                      <p:to>
+                                        <p:strVal val="visible"/>
+                                      </p:to>
+                                    </p:set>
+                                  </p:childTnLst>
+                                </p:cTn>
+                              </p:par>
+                            </p:childTnLst>
+                          </p:cTn>
+                        </p:par>
+                      </p:childTnLst>
+                    </p:cTn>
+                  </p:par>
+                  <p:par>
+                    <p:cTn id="57" fill="hold">
+                      <p:stCondLst>
+                        <p:cond delay="indefinite"/>
+                      </p:stCondLst>
+                      <p:childTnLst>
+                        <p:par>
+                          <p:cTn id="58" fill="hold">
+                            <p:stCondLst>
+                              <p:cond delay="0"/>
+                            </p:stCondLst>
+                            <p:childTnLst>
+                              <p:par>
+                                <p:cTn id="59" presetID="22" presetClass="entr" presetSubtype="8" fill="hold" nodeType="clickEffect">
+                                  <p:stCondLst>
+                                    <p:cond delay="0"/>
+                                  </p:stCondLst>
+                                  <p:childTnLst>
+                                    <p:set>
+                                      <p:cBhvr>
+                                        <p:cTn id="60" dur="1" fill="hold">
+                                          <p:stCondLst>
+                                            <p:cond delay="0"/>
+                                          </p:stCondLst>
+                                        </p:cTn>
+                                        <p:tgtEl>
+                                          <p:spTgt spid="54"/>
+                                        </p:tgtEl>
+                                        <p:attrNameLst>
+                                          <p:attrName>style.visibility</p:attrName>
+                                        </p:attrNameLst>
+                                      </p:cBhvr>
+                                      <p:to>
+                                        <p:strVal val="visible"/>
+                                      </p:to>
+                                    </p:set>
+                                    <p:animEffect transition="in" filter="wipe(left)">
+                                      <p:cBhvr>
+                                        <p:cTn id="61" dur="500"/>
+                                        <p:tgtEl>
+                                          <p:spTgt spid="54"/>
+                                        </p:tgtEl>
+                                      </p:cBhvr>
+                                    </p:animEffect>
+                                  </p:childTnLst>
+                                </p:cTn>
+                              </p:par>
+                            </p:childTnLst>
+                          </p:cTn>
+                        </p:par>
+                        <p:par>
+                          <p:cTn id="62" fill="hold">
+                            <p:stCondLst>
+                              <p:cond delay="500"/>
+                            </p:stCondLst>
+                            <p:childTnLst>
+                              <p:par>
+                                <p:cTn id="63" presetID="1" presetClass="entr" presetSubtype="0" fill="hold" grpId="0" nodeType="afterEffect">
+                                  <p:stCondLst>
+                                    <p:cond delay="0"/>
+                                  </p:stCondLst>
+                                  <p:childTnLst>
+                                    <p:set>
+                                      <p:cBhvr>
+                                        <p:cTn id="64" dur="1" fill="hold">
+                                          <p:stCondLst>
+                                            <p:cond delay="0"/>
+                                          </p:stCondLst>
+                                        </p:cTn>
+                                        <p:tgtEl>
+                                          <p:spTgt spid="56"/>
+                                        </p:tgtEl>
+                                        <p:attrNameLst>
+                                          <p:attrName>style.visibility</p:attrName>
+                                        </p:attrNameLst>
+                                      </p:cBhvr>
+                                      <p:to>
+                                        <p:strVal val="visible"/>
+                                      </p:to>
+                                    </p:set>
+                                  </p:childTnLst>
+                                </p:cTn>
+                              </p:par>
+                            </p:childTnLst>
+                          </p:cTn>
+                        </p:par>
+                        <p:par>
+                          <p:cTn id="65" fill="hold">
+                            <p:stCondLst>
+                              <p:cond delay="500"/>
+                            </p:stCondLst>
+                            <p:childTnLst>
+                              <p:par>
+                                <p:cTn id="66" presetID="53" presetClass="entr" presetSubtype="16" fill="hold" grpId="0" nodeType="afterEffect">
+                                  <p:stCondLst>
+                                    <p:cond delay="0"/>
+                                  </p:stCondLst>
+                                  <p:childTnLst>
+                                    <p:set>
+                                      <p:cBhvr>
+                                        <p:cTn id="67" dur="1" fill="hold">
+                                          <p:stCondLst>
+                                            <p:cond delay="0"/>
+                                          </p:stCondLst>
+                                        </p:cTn>
+                                        <p:tgtEl>
+                                          <p:spTgt spid="63"/>
+                                        </p:tgtEl>
+                                        <p:attrNameLst>
+                                          <p:attrName>style.visibility</p:attrName>
+                                        </p:attrNameLst>
+                                      </p:cBhvr>
+                                      <p:to>
+                                        <p:strVal val="visible"/>
+                                      </p:to>
+                                    </p:set>
+                                    <p:anim calcmode="lin" valueType="num">
+                                      <p:cBhvr>
+                                        <p:cTn id="68" dur="250" fill="hold"/>
+                                        <p:tgtEl>
+                                          <p:spTgt spid="63"/>
+                                        </p:tgtEl>
+                                        <p:attrNameLst>
+                                          <p:attrName>ppt_w</p:attrName>
+                                        </p:attrNameLst>
+                                      </p:cBhvr>
+                                      <p:tavLst>
+                                        <p:tav tm="0">
+                                          <p:val>
+                                            <p:fltVal val="0"/>
+                                          </p:val>
+                                        </p:tav>
+                                        <p:tav tm="100000">
+                                          <p:val>
+                                            <p:strVal val="#ppt_w"/>
+                                          </p:val>
+                                        </p:tav>
+                                      </p:tavLst>
+                                    </p:anim>
+                                    <p:anim calcmode="lin" valueType="num">
+                                      <p:cBhvr>
+                                        <p:cTn id="69" dur="250" fill="hold"/>
+                                        <p:tgtEl>
+                                          <p:spTgt spid="63"/>
+                                        </p:tgtEl>
+                                        <p:attrNameLst>
+                                          <p:attrName>ppt_h</p:attrName>
+                                        </p:attrNameLst>
+                                      </p:cBhvr>
+                                      <p:tavLst>
+                                        <p:tav tm="0">
+                                          <p:val>
+                                            <p:fltVal val="0"/>
+                                          </p:val>
+                                        </p:tav>
+                                        <p:tav tm="100000">
+                                          <p:val>
+                                            <p:strVal val="#ppt_h"/>
+                                          </p:val>
+                                        </p:tav>
+                                      </p:tavLst>
+                                    </p:anim>
+                                    <p:animEffect transition="in" filter="fade">
+                                      <p:cBhvr>
+                                        <p:cTn id="70" dur="250"/>
+                                        <p:tgtEl>
+                                          <p:spTgt spid="63"/>
+                                        </p:tgtEl>
+                                      </p:cBhvr>
+                                    </p:animEffect>
+                                  </p:childTnLst>
+                                </p:cTn>
+                              </p:par>
+                            </p:childTnLst>
+                          </p:cTn>
+                        </p:par>
+                        <p:par>
+                          <p:cTn id="71" fill="hold">
+                            <p:stCondLst>
+                              <p:cond delay="750"/>
+                            </p:stCondLst>
+                            <p:childTnLst>
+                              <p:par>
+                                <p:cTn id="72" presetID="22" presetClass="entr" presetSubtype="1" fill="hold" nodeType="afterEffect">
+                                  <p:stCondLst>
+                                    <p:cond delay="0"/>
+                                  </p:stCondLst>
+                                  <p:childTnLst>
+                                    <p:set>
+                                      <p:cBhvr>
+                                        <p:cTn id="73" dur="1" fill="hold">
+                                          <p:stCondLst>
+                                            <p:cond delay="0"/>
+                                          </p:stCondLst>
+                                        </p:cTn>
+                                        <p:tgtEl>
+                                          <p:spTgt spid="55"/>
+                                        </p:tgtEl>
+                                        <p:attrNameLst>
+                                          <p:attrName>style.visibility</p:attrName>
+                                        </p:attrNameLst>
+                                      </p:cBhvr>
+                                      <p:to>
+                                        <p:strVal val="visible"/>
+                                      </p:to>
+                                    </p:set>
+                                    <p:animEffect transition="in" filter="wipe(up)">
+                                      <p:cBhvr>
+                                        <p:cTn id="74" dur="500"/>
+                                        <p:tgtEl>
+                                          <p:spTgt spid="55"/>
+                                        </p:tgtEl>
+                                      </p:cBhvr>
+                                    </p:animEffect>
+                                  </p:childTnLst>
+                                </p:cTn>
+                              </p:par>
+                            </p:childTnLst>
+                          </p:cTn>
+                        </p:par>
+                        <p:par>
+                          <p:cTn id="75" fill="hold">
+                            <p:stCondLst>
+                              <p:cond delay="1250"/>
+                            </p:stCondLst>
+                            <p:childTnLst>
+                              <p:par>
+                                <p:cTn id="76" presetID="53" presetClass="entr" presetSubtype="16" fill="hold" grpId="0" nodeType="afterEffect">
+                                  <p:stCondLst>
+                                    <p:cond delay="0"/>
+                                  </p:stCondLst>
+                                  <p:childTnLst>
+                                    <p:set>
+                                      <p:cBhvr>
+                                        <p:cTn id="77" dur="1" fill="hold">
+                                          <p:stCondLst>
+                                            <p:cond delay="0"/>
+                                          </p:stCondLst>
+                                        </p:cTn>
+                                        <p:tgtEl>
+                                          <p:spTgt spid="57"/>
+                                        </p:tgtEl>
+                                        <p:attrNameLst>
+                                          <p:attrName>style.visibility</p:attrName>
+                                        </p:attrNameLst>
+                                      </p:cBhvr>
+                                      <p:to>
+                                        <p:strVal val="visible"/>
+                                      </p:to>
+                                    </p:set>
+                                    <p:anim calcmode="lin" valueType="num">
+                                      <p:cBhvr>
+                                        <p:cTn id="78" dur="250" fill="hold"/>
+                                        <p:tgtEl>
+                                          <p:spTgt spid="57"/>
+                                        </p:tgtEl>
+                                        <p:attrNameLst>
+                                          <p:attrName>ppt_w</p:attrName>
+                                        </p:attrNameLst>
+                                      </p:cBhvr>
+                                      <p:tavLst>
+                                        <p:tav tm="0">
+                                          <p:val>
+                                            <p:fltVal val="0"/>
+                                          </p:val>
+                                        </p:tav>
+                                        <p:tav tm="100000">
+                                          <p:val>
+                                            <p:strVal val="#ppt_w"/>
+                                          </p:val>
+                                        </p:tav>
+                                      </p:tavLst>
+                                    </p:anim>
+                                    <p:anim calcmode="lin" valueType="num">
+                                      <p:cBhvr>
+                                        <p:cTn id="79" dur="250" fill="hold"/>
+                                        <p:tgtEl>
+                                          <p:spTgt spid="57"/>
+                                        </p:tgtEl>
+                                        <p:attrNameLst>
+                                          <p:attrName>ppt_h</p:attrName>
+                                        </p:attrNameLst>
+                                      </p:cBhvr>
+                                      <p:tavLst>
+                                        <p:tav tm="0">
+                                          <p:val>
+                                            <p:fltVal val="0"/>
+                                          </p:val>
+                                        </p:tav>
+                                        <p:tav tm="100000">
+                                          <p:val>
+                                            <p:strVal val="#ppt_h"/>
+                                          </p:val>
+                                        </p:tav>
+                                      </p:tavLst>
+                                    </p:anim>
+                                    <p:animEffect transition="in" filter="fade">
+                                      <p:cBhvr>
+                                        <p:cTn id="80" dur="250"/>
+                                        <p:tgtEl>
+                                          <p:spTgt spid="57"/>
+                                        </p:tgtEl>
+                                      </p:cBhvr>
+                                    </p:animEffect>
+                                  </p:childTnLst>
+                                </p:cTn>
+                              </p:par>
+                            </p:childTnLst>
+                          </p:cTn>
+                        </p:par>
+                        <p:par>
+                          <p:cTn id="81" fill="hold">
+                            <p:stCondLst>
+                              <p:cond delay="1500"/>
+                            </p:stCondLst>
+                            <p:childTnLst>
+                              <p:par>
+                                <p:cTn id="82" presetID="1" presetClass="entr" presetSubtype="0" fill="hold" grpId="0" nodeType="afterEffect">
+                                  <p:stCondLst>
+                                    <p:cond delay="0"/>
+                                  </p:stCondLst>
+                                  <p:childTnLst>
+                                    <p:set>
+                                      <p:cBhvr>
+                                        <p:cTn id="83" dur="1" fill="hold">
+                                          <p:stCondLst>
+                                            <p:cond delay="0"/>
+                                          </p:stCondLst>
+                                        </p:cTn>
+                                        <p:tgtEl>
+                                          <p:spTgt spid="58"/>
+                                        </p:tgtEl>
+                                        <p:attrNameLst>
+                                          <p:attrName>style.visibility</p:attrName>
+                                        </p:attrNameLst>
+                                      </p:cBhvr>
+                                      <p:to>
+                                        <p:strVal val="visible"/>
+                                      </p:to>
+                                    </p:set>
+                                  </p:childTnLst>
+                                </p:cTn>
+                              </p:par>
+                            </p:childTnLst>
+                          </p:cTn>
+                        </p:par>
+                      </p:childTnLst>
+                    </p:cTn>
+                  </p:par>
+                  <p:par>
+                    <p:cTn id="84" fill="hold">
+                      <p:stCondLst>
+                        <p:cond delay="indefinite"/>
+                      </p:stCondLst>
+                      <p:childTnLst>
+                        <p:par>
+                          <p:cTn id="85" fill="hold">
+                            <p:stCondLst>
+                              <p:cond delay="0"/>
+                            </p:stCondLst>
+                            <p:childTnLst>
+                              <p:par>
+                                <p:cTn id="86" presetID="22" presetClass="entr" presetSubtype="8" fill="hold" nodeType="clickEffect">
+                                  <p:stCondLst>
+                                    <p:cond delay="0"/>
+                                  </p:stCondLst>
+                                  <p:childTnLst>
+                                    <p:set>
+                                      <p:cBhvr>
+                                        <p:cTn id="87" dur="1" fill="hold">
+                                          <p:stCondLst>
+                                            <p:cond delay="0"/>
+                                          </p:stCondLst>
+                                        </p:cTn>
+                                        <p:tgtEl>
+                                          <p:spTgt spid="59"/>
+                                        </p:tgtEl>
+                                        <p:attrNameLst>
+                                          <p:attrName>style.visibility</p:attrName>
+                                        </p:attrNameLst>
+                                      </p:cBhvr>
+                                      <p:to>
+                                        <p:strVal val="visible"/>
+                                      </p:to>
+                                    </p:set>
+                                    <p:animEffect transition="in" filter="wipe(left)">
+                                      <p:cBhvr>
+                                        <p:cTn id="88" dur="500"/>
+                                        <p:tgtEl>
+                                          <p:spTgt spid="59"/>
+                                        </p:tgtEl>
+                                      </p:cBhvr>
+                                    </p:animEffect>
+                                  </p:childTnLst>
+                                </p:cTn>
+                              </p:par>
+                            </p:childTnLst>
+                          </p:cTn>
+                        </p:par>
+                        <p:par>
+                          <p:cTn id="89" fill="hold">
+                            <p:stCondLst>
+                              <p:cond delay="500"/>
+                            </p:stCondLst>
+                            <p:childTnLst>
+                              <p:par>
+                                <p:cTn id="90" presetID="1" presetClass="entr" presetSubtype="0" fill="hold" grpId="0" nodeType="afterEffect">
+                                  <p:stCondLst>
+                                    <p:cond delay="0"/>
+                                  </p:stCondLst>
+                                  <p:childTnLst>
+                                    <p:set>
+                                      <p:cBhvr>
+                                        <p:cTn id="91" dur="1" fill="hold">
+                                          <p:stCondLst>
+                                            <p:cond delay="0"/>
+                                          </p:stCondLst>
+                                        </p:cTn>
+                                        <p:tgtEl>
+                                          <p:spTgt spid="61"/>
+                                        </p:tgtEl>
+                                        <p:attrNameLst>
+                                          <p:attrName>style.visibility</p:attrName>
+                                        </p:attrNameLst>
+                                      </p:cBhvr>
+                                      <p:to>
+                                        <p:strVal val="visible"/>
+                                      </p:to>
+                                    </p:set>
+                                  </p:childTnLst>
+                                </p:cTn>
+                              </p:par>
+                            </p:childTnLst>
+                          </p:cTn>
+                        </p:par>
+                        <p:par>
+                          <p:cTn id="92" fill="hold">
+                            <p:stCondLst>
+                              <p:cond delay="500"/>
+                            </p:stCondLst>
+                            <p:childTnLst>
+                              <p:par>
+                                <p:cTn id="93" presetID="53" presetClass="entr" presetSubtype="16" fill="hold" grpId="0" nodeType="afterEffect">
+                                  <p:stCondLst>
+                                    <p:cond delay="0"/>
+                                  </p:stCondLst>
+                                  <p:childTnLst>
+                                    <p:set>
+                                      <p:cBhvr>
+                                        <p:cTn id="94" dur="1" fill="hold">
+                                          <p:stCondLst>
+                                            <p:cond delay="0"/>
+                                          </p:stCondLst>
+                                        </p:cTn>
+                                        <p:tgtEl>
+                                          <p:spTgt spid="64"/>
+                                        </p:tgtEl>
+                                        <p:attrNameLst>
+                                          <p:attrName>style.visibility</p:attrName>
+                                        </p:attrNameLst>
+                                      </p:cBhvr>
+                                      <p:to>
+                                        <p:strVal val="visible"/>
+                                      </p:to>
+                                    </p:set>
+                                    <p:anim calcmode="lin" valueType="num">
+                                      <p:cBhvr>
+                                        <p:cTn id="95" dur="250" fill="hold"/>
+                                        <p:tgtEl>
+                                          <p:spTgt spid="64"/>
+                                        </p:tgtEl>
+                                        <p:attrNameLst>
+                                          <p:attrName>ppt_w</p:attrName>
+                                        </p:attrNameLst>
+                                      </p:cBhvr>
+                                      <p:tavLst>
+                                        <p:tav tm="0">
+                                          <p:val>
+                                            <p:fltVal val="0"/>
+                                          </p:val>
+                                        </p:tav>
+                                        <p:tav tm="100000">
+                                          <p:val>
+                                            <p:strVal val="#ppt_w"/>
+                                          </p:val>
+                                        </p:tav>
+                                      </p:tavLst>
+                                    </p:anim>
+                                    <p:anim calcmode="lin" valueType="num">
+                                      <p:cBhvr>
+                                        <p:cTn id="96" dur="250" fill="hold"/>
+                                        <p:tgtEl>
+                                          <p:spTgt spid="64"/>
+                                        </p:tgtEl>
+                                        <p:attrNameLst>
+                                          <p:attrName>ppt_h</p:attrName>
+                                        </p:attrNameLst>
+                                      </p:cBhvr>
+                                      <p:tavLst>
+                                        <p:tav tm="0">
+                                          <p:val>
+                                            <p:fltVal val="0"/>
+                                          </p:val>
+                                        </p:tav>
+                                        <p:tav tm="100000">
+                                          <p:val>
+                                            <p:strVal val="#ppt_h"/>
+                                          </p:val>
+                                        </p:tav>
+                                      </p:tavLst>
+                                    </p:anim>
+                                    <p:animEffect transition="in" filter="fade">
+                                      <p:cBhvr>
+                                        <p:cTn id="97" dur="250"/>
+                                        <p:tgtEl>
+                                          <p:spTgt spid="64"/>
+                                        </p:tgtEl>
+                                      </p:cBhvr>
+                                    </p:animEffect>
+                                  </p:childTnLst>
+                                </p:cTn>
+                              </p:par>
+                            </p:childTnLst>
+                          </p:cTn>
+                        </p:par>
+                        <p:par>
+                          <p:cTn id="98" fill="hold">
+                            <p:stCondLst>
+                              <p:cond delay="750"/>
+                            </p:stCondLst>
+                            <p:childTnLst>
+                              <p:par>
+                                <p:cTn id="99" presetID="22" presetClass="entr" presetSubtype="4" fill="hold" nodeType="afterEffect">
+                                  <p:stCondLst>
+                                    <p:cond delay="0"/>
+                                  </p:stCondLst>
+                                  <p:childTnLst>
+                                    <p:set>
+                                      <p:cBhvr>
+                                        <p:cTn id="100" dur="1" fill="hold">
+                                          <p:stCondLst>
+                                            <p:cond delay="0"/>
+                                          </p:stCondLst>
+                                        </p:cTn>
+                                        <p:tgtEl>
+                                          <p:spTgt spid="60"/>
+                                        </p:tgtEl>
+                                        <p:attrNameLst>
+                                          <p:attrName>style.visibility</p:attrName>
+                                        </p:attrNameLst>
+                                      </p:cBhvr>
+                                      <p:to>
+                                        <p:strVal val="visible"/>
+                                      </p:to>
+                                    </p:set>
+                                    <p:animEffect transition="in" filter="wipe(down)">
+                                      <p:cBhvr>
+                                        <p:cTn id="101" dur="500"/>
+                                        <p:tgtEl>
+                                          <p:spTgt spid="60"/>
+                                        </p:tgtEl>
+                                      </p:cBhvr>
+                                    </p:animEffect>
+                                  </p:childTnLst>
+                                </p:cTn>
+                              </p:par>
+                            </p:childTnLst>
+                          </p:cTn>
+                        </p:par>
+                        <p:par>
+                          <p:cTn id="102" fill="hold">
+                            <p:stCondLst>
+                              <p:cond delay="1250"/>
+                            </p:stCondLst>
+                            <p:childTnLst>
+                              <p:par>
+                                <p:cTn id="103" presetID="53" presetClass="entr" presetSubtype="16" fill="hold" grpId="0" nodeType="afterEffect">
+                                  <p:stCondLst>
+                                    <p:cond delay="0"/>
+                                  </p:stCondLst>
+                                  <p:childTnLst>
+                                    <p:set>
+                                      <p:cBhvr>
+                                        <p:cTn id="104" dur="1" fill="hold">
+                                          <p:stCondLst>
+                                            <p:cond delay="0"/>
+                                          </p:stCondLst>
+                                        </p:cTn>
+                                        <p:tgtEl>
+                                          <p:spTgt spid="62"/>
+                                        </p:tgtEl>
+                                        <p:attrNameLst>
+                                          <p:attrName>style.visibility</p:attrName>
+                                        </p:attrNameLst>
+                                      </p:cBhvr>
+                                      <p:to>
+                                        <p:strVal val="visible"/>
+                                      </p:to>
+                                    </p:set>
+                                    <p:anim calcmode="lin" valueType="num">
+                                      <p:cBhvr>
+                                        <p:cTn id="105" dur="250" fill="hold"/>
+                                        <p:tgtEl>
+                                          <p:spTgt spid="62"/>
+                                        </p:tgtEl>
+                                        <p:attrNameLst>
+                                          <p:attrName>ppt_w</p:attrName>
+                                        </p:attrNameLst>
+                                      </p:cBhvr>
+                                      <p:tavLst>
+                                        <p:tav tm="0">
+                                          <p:val>
+                                            <p:fltVal val="0"/>
+                                          </p:val>
+                                        </p:tav>
+                                        <p:tav tm="100000">
+                                          <p:val>
+                                            <p:strVal val="#ppt_w"/>
+                                          </p:val>
+                                        </p:tav>
+                                      </p:tavLst>
+                                    </p:anim>
+                                    <p:anim calcmode="lin" valueType="num">
+                                      <p:cBhvr>
+                                        <p:cTn id="106" dur="250" fill="hold"/>
+                                        <p:tgtEl>
+                                          <p:spTgt spid="62"/>
+                                        </p:tgtEl>
+                                        <p:attrNameLst>
+                                          <p:attrName>ppt_h</p:attrName>
+                                        </p:attrNameLst>
+                                      </p:cBhvr>
+                                      <p:tavLst>
+                                        <p:tav tm="0">
+                                          <p:val>
+                                            <p:fltVal val="0"/>
+                                          </p:val>
+                                        </p:tav>
+                                        <p:tav tm="100000">
+                                          <p:val>
+                                            <p:strVal val="#ppt_h"/>
+                                          </p:val>
+                                        </p:tav>
+                                      </p:tavLst>
+                                    </p:anim>
+                                    <p:animEffect transition="in" filter="fade">
+                                      <p:cBhvr>
+                                        <p:cTn id="107" dur="250"/>
+                                        <p:tgtEl>
+                                          <p:spTgt spid="62"/>
+                                        </p:tgtEl>
+                                      </p:cBhvr>
+                                    </p:animEffect>
+                                  </p:childTnLst>
+                                </p:cTn>
+                              </p:par>
+                            </p:childTnLst>
+                          </p:cTn>
+                        </p:par>
+                        <p:par>
+                          <p:cTn id="108" fill="hold">
+                            <p:stCondLst>
+                              <p:cond delay="1500"/>
+                            </p:stCondLst>
+                            <p:childTnLst>
+                              <p:par>
+                                <p:cTn id="109" presetID="1" presetClass="entr" presetSubtype="0" fill="hold" grpId="0" nodeType="afterEffect">
+                                  <p:stCondLst>
+                                    <p:cond delay="0"/>
+                                  </p:stCondLst>
+                                  <p:childTnLst>
+                                    <p:set>
+                                      <p:cBhvr>
+                                        <p:cTn id="110" dur="1" fill="hold">
+                                          <p:stCondLst>
+                                            <p:cond delay="0"/>
+                                          </p:stCondLst>
+                                        </p:cTn>
+                                        <p:tgtEl>
+                                          <p:spTgt spid="68"/>
+                                        </p:tgtEl>
+                                        <p:attrNameLst>
+                                          <p:attrName>style.visibility</p:attrName>
+                                        </p:attrNameLst>
+                                      </p:cBhvr>
+                                      <p:to>
+                                        <p:strVal val="visible"/>
+                                      </p:to>
+                                    </p:set>
+                                  </p:childTnLst>
+                                </p:cTn>
+                              </p:par>
+                            </p:childTnLst>
+                          </p:cTn>
+                        </p:par>
+                      </p:childTnLst>
+                    </p:cTn>
+                  </p:par>
+                  <p:par>
+                    <p:cTn id="111" fill="hold">
+                      <p:stCondLst>
+                        <p:cond delay="indefinite"/>
+                      </p:stCondLst>
+                      <p:childTnLst>
+                        <p:par>
+                          <p:cTn id="112" fill="hold">
+                            <p:stCondLst>
+                              <p:cond delay="0"/>
+                            </p:stCondLst>
+                            <p:childTnLst>
+                              <p:par>
+                                <p:cTn id="113" presetID="22" presetClass="entr" presetSubtype="8" fill="hold" nodeType="clickEffect">
+                                  <p:stCondLst>
+                                    <p:cond delay="0"/>
+                                  </p:stCondLst>
+                                  <p:childTnLst>
+                                    <p:set>
+                                      <p:cBhvr>
+                                        <p:cTn id="114" dur="1" fill="hold">
+                                          <p:stCondLst>
+                                            <p:cond delay="0"/>
+                                          </p:stCondLst>
+                                        </p:cTn>
+                                        <p:tgtEl>
+                                          <p:spTgt spid="65"/>
+                                        </p:tgtEl>
+                                        <p:attrNameLst>
+                                          <p:attrName>style.visibility</p:attrName>
+                                        </p:attrNameLst>
+                                      </p:cBhvr>
+                                      <p:to>
+                                        <p:strVal val="visible"/>
+                                      </p:to>
+                                    </p:set>
+                                    <p:animEffect transition="in" filter="wipe(left)">
+                                      <p:cBhvr>
+                                        <p:cTn id="115" dur="500"/>
+                                        <p:tgtEl>
+                                          <p:spTgt spid="65"/>
+                                        </p:tgtEl>
+                                      </p:cBhvr>
+                                    </p:animEffect>
+                                  </p:childTnLst>
+                                </p:cTn>
+                              </p:par>
+                            </p:childTnLst>
+                          </p:cTn>
+                        </p:par>
+                      </p:childTnLst>
+                    </p:cTn>
+                  </p:par>
+                </p:childTnLst>
+              </p:cTn>
+              <p:prevCondLst>
+                <p:cond evt="onPrev" delay="0">
+                  <p:tgtEl>
+                    <p:sldTgt/>
+                  </p:tgtEl>
+                </p:cond>
+              </p:prevCondLst>
+              <p:nextCondLst>
+                <p:cond evt="onNext" delay="0">
+                  <p:tgtEl>
+                    <p:sldTgt/>
+                  </p:tgtEl>
+                </p:cond>
+              </p:nextCondLst>
+            </p:seq>
+          </p:childTnLst>
+        </p:cTn>
+      </p:par>
+    </p:tnLst>
+    <p:bldLst>
+      <p:bldP spid="16" grpId="0"/>
+      <p:bldP spid="17" grpId="0" animBg="1"/>
+      <p:bldP spid="18" grpId="0"/>
+      <p:bldP spid="22" grpId="0"/>
+      <p:bldP spid="23" grpId="0" animBg="1"/>
+      <p:bldP spid="24" grpId="0"/>
+      <p:bldP spid="44" grpId="0" animBg="1"/>
+      <p:bldP spid="48" grpId="0" animBg="1"/>
+      <p:bldP spid="56" grpId="0"/>
+      <p:bldP spid="57" grpId="0" animBg="1"/>
+      <p:bldP spid="58" grpId="0"/>
+      <p:bldP spid="61" grpId="0"/>
+      <p:bldP spid="62" grpId="0" animBg="1"/>
+      <p:bldP spid="63" grpId="0" animBg="1"/>
+      <p:bldP spid="64" grpId="0" animBg="1"/>
+      <p:bldP spid="68" grpId="0"/>
+    </p:bldLst>
+  </p:timing>
+</p:sld>
+</file>
+
 <file path=ppt/theme/theme1.xml><?xml version="1.0" encoding="utf-8"?>
-<a:theme xmlns:a="http://schemas.openxmlformats.org/drawingml/2006/main" name="epam">
+<a:theme xmlns:a="http://schemas.openxmlformats.org/drawingml/2006/main" name="epam-iceberg-vim">
   <a:themeElements>
-    <a:clrScheme name="Custom 347">
+    <a:clrScheme name="Iceberg vim color scheme">
       <a:dk1>
-        <a:srgbClr val="000000"/>
+        <a:srgbClr val="161821"/>
       </a:dk1>
       <a:lt1>
-        <a:srgbClr val="FFFFFF"/>
+        <a:srgbClr val="C6C8D1"/>
       </a:lt1>
       <a:dk2>
-        <a:srgbClr val="666666"/>
+        <a:srgbClr val="1E2132"/>
       </a:dk2>
       <a:lt2>
-        <a:srgbClr val="CCCCCC"/>
+        <a:srgbClr val="6B7089"/>
       </a:lt2>
       <a:accent1>
-        <a:srgbClr val="3A81BA"/>
+        <a:srgbClr val="A093C7"/>
       </a:accent1>
       <a:accent2>
-        <a:srgbClr val="D89F39"/>
+        <a:srgbClr val="84A0C6"/>
       </a:accent2>
       <a:accent3>
-        <a:srgbClr val="8BAB42"/>
+        <a:srgbClr val="89B8C2"/>
       </a:accent3>
       <a:accent4>
-        <a:srgbClr val="57A7B5"/>
+        <a:srgbClr val="B4BE82"/>
       </a:accent4>
       <a:accent5>
-        <a:srgbClr val="8B81D2"/>
+        <a:srgbClr val="E2A478"/>
       </a:accent5>
       <a:accent6>
-        <a:srgbClr val="963334"/>
+        <a:srgbClr val="E27878"/>
       </a:accent6>
       <a:hlink>
         <a:srgbClr val="1155CC"/>
@@ -3032,76 +5896,16 @@
         <a:srgbClr val="6611CC"/>
       </a:folHlink>
     </a:clrScheme>
-    <a:fontScheme name="Office">
+    <a:fontScheme name="Hack font">
       <a:majorFont>
-        <a:latin typeface="Arial"/>
+        <a:latin typeface="Hack"/>
         <a:ea typeface=""/>
         <a:cs typeface=""/>
-        <a:font script="Jpan" typeface="ＭＳ Ｐゴシック"/>
-        <a:font script="Hang" typeface="맑은 고딕"/>
-        <a:font script="Hans" typeface="宋体"/>
-        <a:font script="Hant" typeface="新細明體"/>
-        <a:font script="Arab" typeface="Times New Roman"/>
-        <a:font script="Hebr" typeface="Times New Roman"/>
-        <a:font script="Thai" typeface="Angsana New"/>
-        <a:font script="Ethi" typeface="Nyala"/>
-        <a:font script="Beng" typeface="Vrinda"/>
-        <a:font script="Gujr" typeface="Shruti"/>
-        <a:font script="Khmr" typeface="MoolBoran"/>
-        <a:font script="Knda" typeface="Tunga"/>
-        <a:font script="Guru" typeface="Raavi"/>
-        <a:font script="Cans" typeface="Euphemia"/>
-        <a:font script="Cher" typeface="Plantagenet Cherokee"/>
-        <a:font script="Yiii" typeface="Microsoft Yi Baiti"/>
-        <a:font script="Tibt" typeface="Microsoft Himalaya"/>
-        <a:font script="Thaa" typeface="MV Boli"/>
-        <a:font script="Deva" typeface="Mangal"/>
-        <a:font script="Telu" typeface="Gautami"/>
-        <a:font script="Taml" typeface="Latha"/>
-        <a:font script="Syrc" typeface="Estrangelo Edessa"/>
-        <a:font script="Orya" typeface="Kalinga"/>
-        <a:font script="Mlym" typeface="Kartika"/>
-        <a:font script="Laoo" typeface="DokChampa"/>
-        <a:font script="Sinh" typeface="Iskoola Pota"/>
-        <a:font script="Mong" typeface="Mongolian Baiti"/>
-        <a:font script="Viet" typeface="Times New Roman"/>
-        <a:font script="Uigh" typeface="Microsoft Uighur"/>
-        <a:font script="Geor" typeface="Sylfaen"/>
       </a:majorFont>
       <a:minorFont>
-        <a:latin typeface="Arial"/>
+        <a:latin typeface="Hack"/>
         <a:ea typeface=""/>
         <a:cs typeface=""/>
-        <a:font script="Jpan" typeface="ＭＳ Ｐゴシック"/>
-        <a:font script="Hang" typeface="맑은 고딕"/>
-        <a:font script="Hans" typeface="宋体"/>
-        <a:font script="Hant" typeface="新細明體"/>
-        <a:font script="Arab" typeface="Arial"/>
-        <a:font script="Hebr" typeface="Arial"/>
-        <a:font script="Thai" typeface="Cordia New"/>
-        <a:font script="Ethi" typeface="Nyala"/>
-        <a:font script="Beng" typeface="Vrinda"/>
-        <a:font script="Gujr" typeface="Shruti"/>
-        <a:font script="Khmr" typeface="DaunPenh"/>
-        <a:font script="Knda" typeface="Tunga"/>
-        <a:font script="Guru" typeface="Raavi"/>
-        <a:font script="Cans" typeface="Euphemia"/>
-        <a:font script="Cher" typeface="Plantagenet Cherokee"/>
-        <a:font script="Yiii" typeface="Microsoft Yi Baiti"/>
-        <a:font script="Tibt" typeface="Microsoft Himalaya"/>
-        <a:font script="Thaa" typeface="MV Boli"/>
-        <a:font script="Deva" typeface="Mangal"/>
-        <a:font script="Telu" typeface="Gautami"/>
-        <a:font script="Taml" typeface="Latha"/>
-        <a:font script="Syrc" typeface="Estrangelo Edessa"/>
-        <a:font script="Orya" typeface="Kalinga"/>
-        <a:font script="Mlym" typeface="Kartika"/>
-        <a:font script="Laoo" typeface="DokChampa"/>
-        <a:font script="Sinh" typeface="Iskoola Pota"/>
-        <a:font script="Mong" typeface="Mongolian Baiti"/>
-        <a:font script="Viet" typeface="Arial"/>
-        <a:font script="Uigh" typeface="Microsoft Uighur"/>
-        <a:font script="Geor" typeface="Sylfaen"/>
       </a:minorFont>
     </a:fontScheme>
     <a:fmtScheme name="Office">
@@ -3271,7 +6075,7 @@
   <a:extraClrSchemeLst/>
   <a:extLst>
     <a:ext uri="{05A4C25C-085E-4340-85A3-A5531E510DB2}">
-      <thm15:themeFamily xmlns:thm15="http://schemas.microsoft.com/office/thememl/2012/main" name="epam" id="{3F846DD6-BA48-4134-A9FE-D0FCE4FDC27B}" vid="{39190055-FAAA-4C93-BC67-A01FB09F2C75}"/>
+      <thm15:themeFamily xmlns:thm15="http://schemas.microsoft.com/office/thememl/2012/main" name="epam-iceberg-vim" id="{F9EF7117-DA74-4C3C-B379-952A5AAFDCFC}" vid="{590F8C40-9DE2-4F67-8F2A-7B54E13BFA22}"/>
     </a:ext>
   </a:extLst>
 </a:theme>

</xml_diff>